<commit_message>
add code 5.0 for Joint Code
</commit_message>
<xml_diff>
--- a/3-layer.pptx
+++ b/3-layer.pptx
@@ -7,6 +7,7 @@
   <p:sldIdLst>
     <p:sldId id="256" r:id="rId2"/>
     <p:sldId id="257" r:id="rId3"/>
+    <p:sldId id="258" r:id="rId4"/>
   </p:sldIdLst>
   <p:sldSz cx="12192000" cy="6858000"/>
   <p:notesSz cx="6858000" cy="9144000"/>
@@ -105,6 +106,11 @@
       </a:defRPr>
     </a:lvl9pPr>
   </p:defaultTextStyle>
+  <p:extLst>
+    <p:ext uri="{EFAFB233-063F-42B5-8137-9DF3F51BA10A}">
+      <p15:sldGuideLst xmlns:p15="http://schemas.microsoft.com/office/powerpoint/2012/main"/>
+    </p:ext>
+  </p:extLst>
 </p:presentation>
 </file>
 
@@ -255,7 +261,7 @@
           <a:p>
             <a:fld id="{B77773D2-F309-8A41-8C67-2E3A31CF9785}" type="datetimeFigureOut">
               <a:rPr lang="en-US" smtClean="0"/>
-              <a:t>9/27/20</a:t>
+              <a:t>9/29/20</a:t>
             </a:fld>
             <a:endParaRPr lang="en-US"/>
           </a:p>
@@ -453,7 +459,7 @@
           <a:p>
             <a:fld id="{B77773D2-F309-8A41-8C67-2E3A31CF9785}" type="datetimeFigureOut">
               <a:rPr lang="en-US" smtClean="0"/>
-              <a:t>9/27/20</a:t>
+              <a:t>9/29/20</a:t>
             </a:fld>
             <a:endParaRPr lang="en-US"/>
           </a:p>
@@ -661,7 +667,7 @@
           <a:p>
             <a:fld id="{B77773D2-F309-8A41-8C67-2E3A31CF9785}" type="datetimeFigureOut">
               <a:rPr lang="en-US" smtClean="0"/>
-              <a:t>9/27/20</a:t>
+              <a:t>9/29/20</a:t>
             </a:fld>
             <a:endParaRPr lang="en-US"/>
           </a:p>
@@ -859,7 +865,7 @@
           <a:p>
             <a:fld id="{B77773D2-F309-8A41-8C67-2E3A31CF9785}" type="datetimeFigureOut">
               <a:rPr lang="en-US" smtClean="0"/>
-              <a:t>9/27/20</a:t>
+              <a:t>9/29/20</a:t>
             </a:fld>
             <a:endParaRPr lang="en-US"/>
           </a:p>
@@ -1134,7 +1140,7 @@
           <a:p>
             <a:fld id="{B77773D2-F309-8A41-8C67-2E3A31CF9785}" type="datetimeFigureOut">
               <a:rPr lang="en-US" smtClean="0"/>
-              <a:t>9/27/20</a:t>
+              <a:t>9/29/20</a:t>
             </a:fld>
             <a:endParaRPr lang="en-US"/>
           </a:p>
@@ -1399,7 +1405,7 @@
           <a:p>
             <a:fld id="{B77773D2-F309-8A41-8C67-2E3A31CF9785}" type="datetimeFigureOut">
               <a:rPr lang="en-US" smtClean="0"/>
-              <a:t>9/27/20</a:t>
+              <a:t>9/29/20</a:t>
             </a:fld>
             <a:endParaRPr lang="en-US"/>
           </a:p>
@@ -1811,7 +1817,7 @@
           <a:p>
             <a:fld id="{B77773D2-F309-8A41-8C67-2E3A31CF9785}" type="datetimeFigureOut">
               <a:rPr lang="en-US" smtClean="0"/>
-              <a:t>9/27/20</a:t>
+              <a:t>9/29/20</a:t>
             </a:fld>
             <a:endParaRPr lang="en-US"/>
           </a:p>
@@ -1952,7 +1958,7 @@
           <a:p>
             <a:fld id="{B77773D2-F309-8A41-8C67-2E3A31CF9785}" type="datetimeFigureOut">
               <a:rPr lang="en-US" smtClean="0"/>
-              <a:t>9/27/20</a:t>
+              <a:t>9/29/20</a:t>
             </a:fld>
             <a:endParaRPr lang="en-US"/>
           </a:p>
@@ -2065,7 +2071,7 @@
           <a:p>
             <a:fld id="{B77773D2-F309-8A41-8C67-2E3A31CF9785}" type="datetimeFigureOut">
               <a:rPr lang="en-US" smtClean="0"/>
-              <a:t>9/27/20</a:t>
+              <a:t>9/29/20</a:t>
             </a:fld>
             <a:endParaRPr lang="en-US"/>
           </a:p>
@@ -2376,7 +2382,7 @@
           <a:p>
             <a:fld id="{B77773D2-F309-8A41-8C67-2E3A31CF9785}" type="datetimeFigureOut">
               <a:rPr lang="en-US" smtClean="0"/>
-              <a:t>9/27/20</a:t>
+              <a:t>9/29/20</a:t>
             </a:fld>
             <a:endParaRPr lang="en-US"/>
           </a:p>
@@ -2664,7 +2670,7 @@
           <a:p>
             <a:fld id="{B77773D2-F309-8A41-8C67-2E3A31CF9785}" type="datetimeFigureOut">
               <a:rPr lang="en-US" smtClean="0"/>
-              <a:t>9/27/20</a:t>
+              <a:t>9/29/20</a:t>
             </a:fld>
             <a:endParaRPr lang="en-US"/>
           </a:p>
@@ -2905,7 +2911,7 @@
           <a:p>
             <a:fld id="{B77773D2-F309-8A41-8C67-2E3A31CF9785}" type="datetimeFigureOut">
               <a:rPr lang="en-US" smtClean="0"/>
-              <a:t>9/27/20</a:t>
+              <a:t>9/29/20</a:t>
             </a:fld>
             <a:endParaRPr lang="en-US"/>
           </a:p>
@@ -3565,51 +3571,6 @@
       </p:sp>
       <p:cxnSp>
         <p:nvCxnSpPr>
-          <p:cNvPr id="6" name="Straight Arrow Connector 5">
-            <a:extLst>
-              <a:ext uri="{FF2B5EF4-FFF2-40B4-BE49-F238E27FC236}">
-                <a16:creationId xmlns:a16="http://schemas.microsoft.com/office/drawing/2014/main" id="{F399A176-6039-EE47-8B47-41E94FCA4567}"/>
-              </a:ext>
-            </a:extLst>
-          </p:cNvPr>
-          <p:cNvCxnSpPr>
-            <a:cxnSpLocks/>
-            <a:endCxn id="2" idx="1"/>
-          </p:cNvCxnSpPr>
-          <p:nvPr/>
-        </p:nvCxnSpPr>
-        <p:spPr>
-          <a:xfrm>
-            <a:off x="2384854" y="1606378"/>
-            <a:ext cx="1964724" cy="0"/>
-          </a:xfrm>
-          <a:prstGeom prst="straightConnector1">
-            <a:avLst/>
-          </a:prstGeom>
-          <a:ln w="63500">
-            <a:solidFill>
-              <a:schemeClr val="tx2"/>
-            </a:solidFill>
-            <a:tailEnd type="triangle"/>
-          </a:ln>
-        </p:spPr>
-        <p:style>
-          <a:lnRef idx="1">
-            <a:schemeClr val="accent1"/>
-          </a:lnRef>
-          <a:fillRef idx="0">
-            <a:schemeClr val="accent1"/>
-          </a:fillRef>
-          <a:effectRef idx="0">
-            <a:schemeClr val="accent1"/>
-          </a:effectRef>
-          <a:fontRef idx="minor">
-            <a:schemeClr val="tx1"/>
-          </a:fontRef>
-        </p:style>
-      </p:cxnSp>
-      <p:cxnSp>
-        <p:nvCxnSpPr>
           <p:cNvPr id="13" name="Straight Arrow Connector 12">
             <a:extLst>
               <a:ext uri="{FF2B5EF4-FFF2-40B4-BE49-F238E27FC236}">
@@ -3711,14 +3672,15 @@
           </p:cNvPr>
           <p:cNvCxnSpPr>
             <a:cxnSpLocks/>
-            <a:stCxn id="4" idx="1"/>
+            <a:stCxn id="4" idx="3"/>
+            <a:endCxn id="48" idx="1"/>
           </p:cNvCxnSpPr>
           <p:nvPr/>
         </p:nvCxnSpPr>
         <p:spPr>
-          <a:xfrm flipH="1">
-            <a:off x="2384854" y="4734911"/>
-            <a:ext cx="1964724" cy="0"/>
+          <a:xfrm>
+            <a:off x="5995498" y="4734911"/>
+            <a:ext cx="1838686" cy="0"/>
           </a:xfrm>
           <a:prstGeom prst="straightConnector1">
             <a:avLst/>
@@ -3759,10 +3721,10 @@
         </p:nvGrpSpPr>
         <p:grpSpPr>
           <a:xfrm>
-            <a:off x="2845182" y="1161534"/>
-            <a:ext cx="1354799" cy="914400"/>
-            <a:chOff x="2845182" y="1161534"/>
-            <a:chExt cx="1354799" cy="914400"/>
+            <a:off x="3041078" y="1171901"/>
+            <a:ext cx="1308500" cy="896562"/>
+            <a:chOff x="2891481" y="1167016"/>
+            <a:chExt cx="1308500" cy="896562"/>
           </a:xfrm>
         </p:grpSpPr>
         <mc:AlternateContent xmlns:mc="http://schemas.openxmlformats.org/markup-compatibility/2006">
@@ -3795,6 +3757,7 @@
                 </a:bodyPr>
                 <a:lstStyle/>
                 <a:p>
+                  <a:pPr/>
                   <a14:m>
                     <m:oMathPara xmlns:m="http://schemas.openxmlformats.org/officeDocument/2006/math">
                       <m:oMathParaPr>
@@ -3805,6 +3768,9 @@
                           <m:sSubSupPr>
                             <m:ctrlPr>
                               <a:rPr lang="en-US" i="1" smtClean="0">
+                                <a:solidFill>
+                                  <a:srgbClr val="FF0000"/>
+                                </a:solidFill>
                                 <a:latin typeface="Cambria Math" panose="02040503050406030204" pitchFamily="18" charset="0"/>
                               </a:rPr>
                             </m:ctrlPr>
@@ -3812,6 +3778,9 @@
                           <m:e>
                             <m:r>
                               <a:rPr lang="en-US" b="0" i="1" smtClean="0">
+                                <a:solidFill>
+                                  <a:srgbClr val="FF0000"/>
+                                </a:solidFill>
                                 <a:latin typeface="Cambria Math" panose="02040503050406030204" pitchFamily="18" charset="0"/>
                               </a:rPr>
                               <m:t>𝑃</m:t>
@@ -3820,6 +3789,9 @@
                           <m:sub>
                             <m:r>
                               <a:rPr lang="en-US" b="0" i="1" smtClean="0">
+                                <a:solidFill>
+                                  <a:srgbClr val="FF0000"/>
+                                </a:solidFill>
                                 <a:latin typeface="Cambria Math" panose="02040503050406030204" pitchFamily="18" charset="0"/>
                               </a:rPr>
                               <m:t>𝑓</m:t>
@@ -3828,6 +3800,9 @@
                           <m:sup>
                             <m:r>
                               <a:rPr lang="en-US" b="0" i="1" smtClean="0">
+                                <a:solidFill>
+                                  <a:srgbClr val="FF0000"/>
+                                </a:solidFill>
                                 <a:latin typeface="Cambria Math" panose="02040503050406030204" pitchFamily="18" charset="0"/>
                               </a:rPr>
                               <m:t>𝑑</m:t>
@@ -3836,6 +3811,9 @@
                         </m:sSubSup>
                         <m:r>
                           <a:rPr lang="en-US" b="0" i="1" smtClean="0">
+                            <a:solidFill>
+                              <a:srgbClr val="FF0000"/>
+                            </a:solidFill>
                             <a:latin typeface="Cambria Math" panose="02040503050406030204" pitchFamily="18" charset="0"/>
                           </a:rPr>
                           <m:t>−</m:t>
@@ -3844,6 +3822,9 @@
                           <m:sSubSupPr>
                             <m:ctrlPr>
                               <a:rPr lang="en-US" b="0" i="1" smtClean="0">
+                                <a:solidFill>
+                                  <a:srgbClr val="FF0000"/>
+                                </a:solidFill>
                                 <a:latin typeface="Cambria Math" panose="02040503050406030204" pitchFamily="18" charset="0"/>
                               </a:rPr>
                             </m:ctrlPr>
@@ -3851,6 +3832,9 @@
                           <m:e>
                             <m:r>
                               <a:rPr lang="en-US" b="0" i="1" smtClean="0">
+                                <a:solidFill>
+                                  <a:srgbClr val="FF0000"/>
+                                </a:solidFill>
                                 <a:latin typeface="Cambria Math" panose="02040503050406030204" pitchFamily="18" charset="0"/>
                               </a:rPr>
                               <m:t>𝑃</m:t>
@@ -3859,6 +3843,9 @@
                           <m:sub>
                             <m:r>
                               <a:rPr lang="en-US" b="0" i="1" smtClean="0">
+                                <a:solidFill>
+                                  <a:srgbClr val="FF0000"/>
+                                </a:solidFill>
                                 <a:latin typeface="Cambria Math" panose="02040503050406030204" pitchFamily="18" charset="0"/>
                               </a:rPr>
                               <m:t>𝑓</m:t>
@@ -3867,6 +3854,9 @@
                           <m:sup>
                             <m:r>
                               <a:rPr lang="en-US" b="0" i="1" smtClean="0">
+                                <a:solidFill>
+                                  <a:srgbClr val="FF0000"/>
+                                </a:solidFill>
                                 <a:latin typeface="Cambria Math" panose="02040503050406030204" pitchFamily="18" charset="0"/>
                               </a:rPr>
                               <m:t>𝑚𝑎𝑥</m:t>
@@ -3876,7 +3866,11 @@
                       </m:oMath>
                     </m:oMathPara>
                   </a14:m>
-                  <a:endParaRPr lang="en-US" dirty="0"/>
+                  <a:endParaRPr lang="en-US" dirty="0">
+                    <a:solidFill>
+                      <a:srgbClr val="FF0000"/>
+                    </a:solidFill>
+                  </a:endParaRPr>
                 </a:p>
               </p:txBody>
             </p:sp>
@@ -3907,7 +3901,7 @@
                 <a:blipFill>
                   <a:blip r:embed="rId2"/>
                   <a:stretch>
-                    <a:fillRect b="-2857"/>
+                    <a:fillRect b="-5882"/>
                   </a:stretch>
                 </a:blipFill>
               </p:spPr>
@@ -3956,6 +3950,7 @@
                 </a:bodyPr>
                 <a:lstStyle/>
                 <a:p>
+                  <a:pPr/>
                   <a14:m>
                     <m:oMathPara xmlns:m="http://schemas.openxmlformats.org/officeDocument/2006/math">
                       <m:oMathParaPr>
@@ -3966,6 +3961,9 @@
                           <m:sSubSupPr>
                             <m:ctrlPr>
                               <a:rPr lang="en-US" i="1" smtClean="0">
+                                <a:solidFill>
+                                  <a:srgbClr val="FF0000"/>
+                                </a:solidFill>
                                 <a:latin typeface="Cambria Math" panose="02040503050406030204" pitchFamily="18" charset="0"/>
                               </a:rPr>
                             </m:ctrlPr>
@@ -3973,6 +3971,9 @@
                           <m:e>
                             <m:r>
                               <a:rPr lang="en-US" b="0" i="1" smtClean="0">
+                                <a:solidFill>
+                                  <a:srgbClr val="FF0000"/>
+                                </a:solidFill>
                                 <a:latin typeface="Cambria Math" panose="02040503050406030204" pitchFamily="18" charset="0"/>
                               </a:rPr>
                               <m:t>𝑄</m:t>
@@ -3981,6 +3982,9 @@
                           <m:sub>
                             <m:r>
                               <a:rPr lang="en-US" b="0" i="1" smtClean="0">
+                                <a:solidFill>
+                                  <a:srgbClr val="FF0000"/>
+                                </a:solidFill>
                                 <a:latin typeface="Cambria Math" panose="02040503050406030204" pitchFamily="18" charset="0"/>
                               </a:rPr>
                               <m:t>𝑓</m:t>
@@ -3989,6 +3993,9 @@
                           <m:sup>
                             <m:r>
                               <a:rPr lang="en-US" b="0" i="1" smtClean="0">
+                                <a:solidFill>
+                                  <a:srgbClr val="FF0000"/>
+                                </a:solidFill>
                                 <a:latin typeface="Cambria Math" panose="02040503050406030204" pitchFamily="18" charset="0"/>
                               </a:rPr>
                               <m:t>𝑑</m:t>
@@ -4048,66 +4055,534 @@
             </p:sp>
           </mc:Fallback>
         </mc:AlternateContent>
-        <p:sp>
-          <p:nvSpPr>
-            <p:cNvPr id="38" name="Rectangle 37">
-              <a:extLst>
-                <a:ext uri="{FF2B5EF4-FFF2-40B4-BE49-F238E27FC236}">
-                  <a16:creationId xmlns:a16="http://schemas.microsoft.com/office/drawing/2014/main" id="{FA0A1696-E13C-2848-A003-6E8648847B00}"/>
-                </a:ext>
-              </a:extLst>
-            </p:cNvPr>
-            <p:cNvSpPr/>
-            <p:nvPr/>
-          </p:nvSpPr>
-          <p:spPr>
-            <a:xfrm>
-              <a:off x="2845182" y="1161534"/>
-              <a:ext cx="1308501" cy="914400"/>
-            </a:xfrm>
-            <a:prstGeom prst="rect">
-              <a:avLst/>
-            </a:prstGeom>
-            <a:noFill/>
-            <a:ln w="38100">
-              <a:solidFill>
-                <a:schemeClr val="accent2"/>
-              </a:solidFill>
-              <a:prstDash val="sysDot"/>
-            </a:ln>
-          </p:spPr>
-          <p:style>
-            <a:lnRef idx="2">
-              <a:schemeClr val="accent1">
-                <a:shade val="50000"/>
-              </a:schemeClr>
-            </a:lnRef>
-            <a:fillRef idx="1">
-              <a:schemeClr val="accent1"/>
-            </a:fillRef>
-            <a:effectRef idx="0">
-              <a:schemeClr val="accent1"/>
-            </a:effectRef>
-            <a:fontRef idx="minor">
-              <a:schemeClr val="lt1"/>
-            </a:fontRef>
-          </p:style>
-          <p:txBody>
-            <a:bodyPr rtlCol="0" anchor="ctr"/>
-            <a:lstStyle/>
-            <a:p>
-              <a:pPr algn="ctr"/>
-              <a:endParaRPr lang="en-US"/>
-            </a:p>
-          </p:txBody>
-        </p:sp>
       </p:grpSp>
+      <mc:AlternateContent xmlns:mc="http://schemas.openxmlformats.org/markup-compatibility/2006">
+        <mc:Choice xmlns:a14="http://schemas.microsoft.com/office/drawing/2010/main" Requires="a14">
+          <p:sp>
+            <p:nvSpPr>
+              <p:cNvPr id="22" name="TextBox 21">
+                <a:extLst>
+                  <a:ext uri="{FF2B5EF4-FFF2-40B4-BE49-F238E27FC236}">
+                    <a16:creationId xmlns:a16="http://schemas.microsoft.com/office/drawing/2014/main" id="{59293EE5-1F94-A04C-BEA7-BD57B0F5D486}"/>
+                  </a:ext>
+                </a:extLst>
+              </p:cNvPr>
+              <p:cNvSpPr txBox="1"/>
+              <p:nvPr/>
+            </p:nvSpPr>
+            <p:spPr>
+              <a:xfrm>
+                <a:off x="5172538" y="3691153"/>
+                <a:ext cx="1225014" cy="434478"/>
+              </a:xfrm>
+              <a:prstGeom prst="rect">
+                <a:avLst/>
+              </a:prstGeom>
+              <a:noFill/>
+            </p:spPr>
+            <p:txBody>
+              <a:bodyPr wrap="none" rtlCol="0">
+                <a:spAutoFit/>
+              </a:bodyPr>
+              <a:lstStyle/>
+              <a:p>
+                <a:pPr/>
+                <a14:m>
+                  <m:oMathPara xmlns:m="http://schemas.openxmlformats.org/officeDocument/2006/math">
+                    <m:oMathParaPr>
+                      <m:jc m:val="centerGroup"/>
+                    </m:oMathParaPr>
+                    <m:oMath xmlns:m="http://schemas.openxmlformats.org/officeDocument/2006/math">
+                      <m:sSubSup>
+                        <m:sSubSupPr>
+                          <m:ctrlPr>
+                            <a:rPr lang="en-US" i="1" smtClean="0">
+                              <a:solidFill>
+                                <a:srgbClr val="FF0000"/>
+                              </a:solidFill>
+                              <a:latin typeface="Cambria Math" panose="02040503050406030204" pitchFamily="18" charset="0"/>
+                            </a:rPr>
+                          </m:ctrlPr>
+                        </m:sSubSupPr>
+                        <m:e>
+                          <m:r>
+                            <a:rPr lang="en-US" b="0" i="1" smtClean="0">
+                              <a:solidFill>
+                                <a:srgbClr val="FF0000"/>
+                              </a:solidFill>
+                              <a:latin typeface="Cambria Math" panose="02040503050406030204" pitchFamily="18" charset="0"/>
+                            </a:rPr>
+                            <m:t>𝑃</m:t>
+                          </m:r>
+                        </m:e>
+                        <m:sub>
+                          <m:r>
+                            <a:rPr lang="en-US" b="0" i="1" smtClean="0">
+                              <a:solidFill>
+                                <a:srgbClr val="FF0000"/>
+                              </a:solidFill>
+                              <a:latin typeface="Cambria Math" panose="02040503050406030204" pitchFamily="18" charset="0"/>
+                            </a:rPr>
+                            <m:t>𝑓</m:t>
+                          </m:r>
+                        </m:sub>
+                        <m:sup>
+                          <m:r>
+                            <a:rPr lang="en-US" b="0" i="1" smtClean="0">
+                              <a:solidFill>
+                                <a:srgbClr val="FF0000"/>
+                              </a:solidFill>
+                              <a:latin typeface="Cambria Math" panose="02040503050406030204" pitchFamily="18" charset="0"/>
+                            </a:rPr>
+                            <m:t>𝑔</m:t>
+                          </m:r>
+                        </m:sup>
+                      </m:sSubSup>
+                      <m:r>
+                        <a:rPr lang="en-US" b="0" i="1" smtClean="0">
+                          <a:solidFill>
+                            <a:srgbClr val="FF0000"/>
+                          </a:solidFill>
+                          <a:latin typeface="Cambria Math" panose="02040503050406030204" pitchFamily="18" charset="0"/>
+                        </a:rPr>
+                        <m:t>,</m:t>
+                      </m:r>
+                      <m:sSubSup>
+                        <m:sSubSupPr>
+                          <m:ctrlPr>
+                            <a:rPr lang="en-US" i="1" smtClean="0">
+                              <a:solidFill>
+                                <a:srgbClr val="FF0000"/>
+                              </a:solidFill>
+                              <a:latin typeface="Cambria Math" panose="02040503050406030204" pitchFamily="18" charset="0"/>
+                            </a:rPr>
+                          </m:ctrlPr>
+                        </m:sSubSupPr>
+                        <m:e>
+                          <m:r>
+                            <a:rPr lang="en-US" b="0" i="1" smtClean="0">
+                              <a:solidFill>
+                                <a:srgbClr val="FF0000"/>
+                              </a:solidFill>
+                              <a:latin typeface="Cambria Math" panose="02040503050406030204" pitchFamily="18" charset="0"/>
+                            </a:rPr>
+                            <m:t>𝑄</m:t>
+                          </m:r>
+                        </m:e>
+                        <m:sub>
+                          <m:r>
+                            <a:rPr lang="en-US" b="0" i="1" smtClean="0">
+                              <a:solidFill>
+                                <a:srgbClr val="FF0000"/>
+                              </a:solidFill>
+                              <a:latin typeface="Cambria Math" panose="02040503050406030204" pitchFamily="18" charset="0"/>
+                            </a:rPr>
+                            <m:t>𝑓</m:t>
+                          </m:r>
+                        </m:sub>
+                        <m:sup>
+                          <m:r>
+                            <a:rPr lang="en-US" b="0" i="1" smtClean="0">
+                              <a:solidFill>
+                                <a:srgbClr val="FF0000"/>
+                              </a:solidFill>
+                              <a:latin typeface="Cambria Math" panose="02040503050406030204" pitchFamily="18" charset="0"/>
+                            </a:rPr>
+                            <m:t>𝑔</m:t>
+                          </m:r>
+                        </m:sup>
+                      </m:sSubSup>
+                      <m:r>
+                        <a:rPr lang="en-US" b="0" i="1" smtClean="0">
+                          <a:solidFill>
+                            <a:srgbClr val="FF0000"/>
+                          </a:solidFill>
+                          <a:latin typeface="Cambria Math" panose="02040503050406030204" pitchFamily="18" charset="0"/>
+                        </a:rPr>
+                        <m:t>,</m:t>
+                      </m:r>
+                      <m:r>
+                        <a:rPr lang="en-US" b="0" i="0" smtClean="0">
+                          <a:solidFill>
+                            <a:srgbClr val="FF0000"/>
+                          </a:solidFill>
+                          <a:latin typeface="Cambria Math" panose="02040503050406030204" pitchFamily="18" charset="0"/>
+                        </a:rPr>
+                        <m:t> </m:t>
+                      </m:r>
+                      <m:sSub>
+                        <m:sSubPr>
+                          <m:ctrlPr>
+                            <a:rPr lang="en-US" b="0" i="1" smtClean="0">
+                              <a:solidFill>
+                                <a:srgbClr val="FF0000"/>
+                              </a:solidFill>
+                              <a:latin typeface="Cambria Math" panose="02040503050406030204" pitchFamily="18" charset="0"/>
+                            </a:rPr>
+                          </m:ctrlPr>
+                        </m:sSubPr>
+                        <m:e>
+                          <m:r>
+                            <a:rPr lang="en-US" b="0" i="1" smtClean="0">
+                              <a:solidFill>
+                                <a:srgbClr val="FF0000"/>
+                              </a:solidFill>
+                              <a:latin typeface="Cambria Math" panose="02040503050406030204" pitchFamily="18" charset="0"/>
+                            </a:rPr>
+                            <m:t>𝑅</m:t>
+                          </m:r>
+                        </m:e>
+                        <m:sub>
+                          <m:r>
+                            <a:rPr lang="en-US" b="0" i="1" smtClean="0">
+                              <a:solidFill>
+                                <a:srgbClr val="FF0000"/>
+                              </a:solidFill>
+                              <a:latin typeface="Cambria Math" panose="02040503050406030204" pitchFamily="18" charset="0"/>
+                            </a:rPr>
+                            <m:t>𝑓</m:t>
+                          </m:r>
+                        </m:sub>
+                      </m:sSub>
+                    </m:oMath>
+                  </m:oMathPara>
+                </a14:m>
+                <a:endParaRPr lang="en-US" dirty="0">
+                  <a:solidFill>
+                    <a:srgbClr val="FF0000"/>
+                  </a:solidFill>
+                </a:endParaRPr>
+              </a:p>
+            </p:txBody>
+          </p:sp>
+        </mc:Choice>
+        <mc:Fallback>
+          <p:sp>
+            <p:nvSpPr>
+              <p:cNvPr id="22" name="TextBox 21">
+                <a:extLst>
+                  <a:ext uri="{FF2B5EF4-FFF2-40B4-BE49-F238E27FC236}">
+                    <a16:creationId xmlns:a16="http://schemas.microsoft.com/office/drawing/2014/main" id="{59293EE5-1F94-A04C-BEA7-BD57B0F5D486}"/>
+                  </a:ext>
+                </a:extLst>
+              </p:cNvPr>
+              <p:cNvSpPr txBox="1">
+                <a:spLocks noRot="1" noChangeAspect="1" noMove="1" noResize="1" noEditPoints="1" noAdjustHandles="1" noChangeArrowheads="1" noChangeShapeType="1" noTextEdit="1"/>
+              </p:cNvSpPr>
+              <p:nvPr/>
+            </p:nvSpPr>
+            <p:spPr>
+              <a:xfrm>
+                <a:off x="5172538" y="3691153"/>
+                <a:ext cx="1225014" cy="434478"/>
+              </a:xfrm>
+              <a:prstGeom prst="rect">
+                <a:avLst/>
+              </a:prstGeom>
+              <a:blipFill>
+                <a:blip r:embed="rId4"/>
+                <a:stretch>
+                  <a:fillRect b="-5714"/>
+                </a:stretch>
+              </a:blipFill>
+            </p:spPr>
+            <p:txBody>
+              <a:bodyPr/>
+              <a:lstStyle/>
+              <a:p>
+                <a:r>
+                  <a:rPr lang="en-US">
+                    <a:noFill/>
+                  </a:rPr>
+                  <a:t> </a:t>
+                </a:r>
+              </a:p>
+            </p:txBody>
+          </p:sp>
+        </mc:Fallback>
+      </mc:AlternateContent>
+      <mc:AlternateContent xmlns:mc="http://schemas.openxmlformats.org/markup-compatibility/2006">
+        <mc:Choice xmlns:a14="http://schemas.microsoft.com/office/drawing/2010/main" Requires="a14">
+          <p:sp>
+            <p:nvSpPr>
+              <p:cNvPr id="17" name="TextBox 16">
+                <a:extLst>
+                  <a:ext uri="{FF2B5EF4-FFF2-40B4-BE49-F238E27FC236}">
+                    <a16:creationId xmlns:a16="http://schemas.microsoft.com/office/drawing/2014/main" id="{6AB565C1-9EF2-B04C-930A-970367EF6B63}"/>
+                  </a:ext>
+                </a:extLst>
+              </p:cNvPr>
+              <p:cNvSpPr txBox="1"/>
+              <p:nvPr/>
+            </p:nvSpPr>
+            <p:spPr>
+              <a:xfrm>
+                <a:off x="5172538" y="2138057"/>
+                <a:ext cx="1733551" cy="407227"/>
+              </a:xfrm>
+              <a:prstGeom prst="rect">
+                <a:avLst/>
+              </a:prstGeom>
+              <a:noFill/>
+            </p:spPr>
+            <p:txBody>
+              <a:bodyPr wrap="none" rtlCol="0">
+                <a:spAutoFit/>
+              </a:bodyPr>
+              <a:lstStyle/>
+              <a:p>
+                <a:pPr/>
+                <a14:m>
+                  <m:oMathPara xmlns:m="http://schemas.openxmlformats.org/officeDocument/2006/math">
+                    <m:oMathParaPr>
+                      <m:jc m:val="centerGroup"/>
+                    </m:oMathParaPr>
+                    <m:oMath xmlns:m="http://schemas.openxmlformats.org/officeDocument/2006/math">
+                      <m:sSubSup>
+                        <m:sSubSupPr>
+                          <m:ctrlPr>
+                            <a:rPr lang="en-US" i="1" smtClean="0">
+                              <a:latin typeface="Cambria Math" panose="02040503050406030204" pitchFamily="18" charset="0"/>
+                            </a:rPr>
+                          </m:ctrlPr>
+                        </m:sSubSupPr>
+                        <m:e>
+                          <m:r>
+                            <a:rPr lang="en-US" b="0" i="1" smtClean="0">
+                              <a:latin typeface="Cambria Math" panose="02040503050406030204" pitchFamily="18" charset="0"/>
+                            </a:rPr>
+                            <m:t>𝑃</m:t>
+                          </m:r>
+                        </m:e>
+                        <m:sub>
+                          <m:r>
+                            <a:rPr lang="en-US" b="0" i="1" smtClean="0">
+                              <a:latin typeface="Cambria Math" panose="02040503050406030204" pitchFamily="18" charset="0"/>
+                            </a:rPr>
+                            <m:t>𝑖</m:t>
+                          </m:r>
+                          <m:r>
+                            <a:rPr lang="en-US" b="0" i="1" smtClean="0">
+                              <a:latin typeface="Cambria Math" panose="02040503050406030204" pitchFamily="18" charset="0"/>
+                            </a:rPr>
+                            <m:t>,</m:t>
+                          </m:r>
+                          <m:r>
+                            <a:rPr lang="en-US" b="0" i="1" smtClean="0">
+                              <a:latin typeface="Cambria Math" panose="02040503050406030204" pitchFamily="18" charset="0"/>
+                            </a:rPr>
+                            <m:t>𝑘</m:t>
+                          </m:r>
+                        </m:sub>
+                        <m:sup>
+                          <m:r>
+                            <a:rPr lang="en-US" b="0" i="1" smtClean="0">
+                              <a:latin typeface="Cambria Math" panose="02040503050406030204" pitchFamily="18" charset="0"/>
+                            </a:rPr>
+                            <m:t>0</m:t>
+                          </m:r>
+                        </m:sup>
+                      </m:sSubSup>
+                      <m:r>
+                        <a:rPr lang="en-US" b="0" i="1" smtClean="0">
+                          <a:latin typeface="Cambria Math" panose="02040503050406030204" pitchFamily="18" charset="0"/>
+                        </a:rPr>
+                        <m:t>,</m:t>
+                      </m:r>
+                      <m:sSubSup>
+                        <m:sSubSupPr>
+                          <m:ctrlPr>
+                            <a:rPr lang="en-US" i="1" smtClean="0">
+                              <a:latin typeface="Cambria Math" panose="02040503050406030204" pitchFamily="18" charset="0"/>
+                            </a:rPr>
+                          </m:ctrlPr>
+                        </m:sSubSupPr>
+                        <m:e>
+                          <m:r>
+                            <a:rPr lang="en-US" b="0" i="1" smtClean="0">
+                              <a:latin typeface="Cambria Math" panose="02040503050406030204" pitchFamily="18" charset="0"/>
+                            </a:rPr>
+                            <m:t>𝑄</m:t>
+                          </m:r>
+                        </m:e>
+                        <m:sub>
+                          <m:r>
+                            <a:rPr lang="en-US" b="0" i="1" smtClean="0">
+                              <a:latin typeface="Cambria Math" panose="02040503050406030204" pitchFamily="18" charset="0"/>
+                            </a:rPr>
+                            <m:t>𝑖</m:t>
+                          </m:r>
+                          <m:r>
+                            <a:rPr lang="en-US" b="0" i="1" smtClean="0">
+                              <a:latin typeface="Cambria Math" panose="02040503050406030204" pitchFamily="18" charset="0"/>
+                            </a:rPr>
+                            <m:t>,</m:t>
+                          </m:r>
+                          <m:r>
+                            <a:rPr lang="en-US" b="0" i="1" smtClean="0">
+                              <a:latin typeface="Cambria Math" panose="02040503050406030204" pitchFamily="18" charset="0"/>
+                            </a:rPr>
+                            <m:t>𝑘</m:t>
+                          </m:r>
+                        </m:sub>
+                        <m:sup>
+                          <m:r>
+                            <a:rPr lang="en-US" b="0" i="1" smtClean="0">
+                              <a:latin typeface="Cambria Math" panose="02040503050406030204" pitchFamily="18" charset="0"/>
+                            </a:rPr>
+                            <m:t>0</m:t>
+                          </m:r>
+                        </m:sup>
+                      </m:sSubSup>
+                      <m:r>
+                        <a:rPr lang="en-US" b="0" i="1" smtClean="0">
+                          <a:latin typeface="Cambria Math" panose="02040503050406030204" pitchFamily="18" charset="0"/>
+                        </a:rPr>
+                        <m:t>,</m:t>
+                      </m:r>
+                      <m:sSubSup>
+                        <m:sSubSupPr>
+                          <m:ctrlPr>
+                            <a:rPr lang="en-US" i="1" smtClean="0">
+                              <a:latin typeface="Cambria Math" panose="02040503050406030204" pitchFamily="18" charset="0"/>
+                            </a:rPr>
+                          </m:ctrlPr>
+                        </m:sSubSupPr>
+                        <m:e>
+                          <m:r>
+                            <a:rPr lang="en-US" b="0" i="1" smtClean="0">
+                              <a:latin typeface="Cambria Math" panose="02040503050406030204" pitchFamily="18" charset="0"/>
+                            </a:rPr>
+                            <m:t>𝑣</m:t>
+                          </m:r>
+                        </m:e>
+                        <m:sub>
+                          <m:r>
+                            <a:rPr lang="en-US" b="0" i="1" smtClean="0">
+                              <a:latin typeface="Cambria Math" panose="02040503050406030204" pitchFamily="18" charset="0"/>
+                            </a:rPr>
+                            <m:t>𝑖</m:t>
+                          </m:r>
+                        </m:sub>
+                        <m:sup>
+                          <m:r>
+                            <a:rPr lang="en-US" b="0" i="1" smtClean="0">
+                              <a:latin typeface="Cambria Math" panose="02040503050406030204" pitchFamily="18" charset="0"/>
+                            </a:rPr>
+                            <m:t>0</m:t>
+                          </m:r>
+                        </m:sup>
+                      </m:sSubSup>
+                      <m:r>
+                        <a:rPr lang="en-US" b="0" i="1" smtClean="0">
+                          <a:latin typeface="Cambria Math" panose="02040503050406030204" pitchFamily="18" charset="0"/>
+                        </a:rPr>
+                        <m:t>, </m:t>
+                      </m:r>
+                      <m:sSubSup>
+                        <m:sSubSupPr>
+                          <m:ctrlPr>
+                            <a:rPr lang="en-US" i="1" smtClean="0">
+                              <a:latin typeface="Cambria Math" panose="02040503050406030204" pitchFamily="18" charset="0"/>
+                            </a:rPr>
+                          </m:ctrlPr>
+                        </m:sSubSupPr>
+                        <m:e>
+                          <m:r>
+                            <a:rPr lang="en-US" b="0" i="1" smtClean="0">
+                              <a:latin typeface="Cambria Math" panose="02040503050406030204" pitchFamily="18" charset="0"/>
+                            </a:rPr>
+                            <m:t>𝑙</m:t>
+                          </m:r>
+                        </m:e>
+                        <m:sub>
+                          <m:r>
+                            <a:rPr lang="en-US" b="0" i="1" smtClean="0">
+                              <a:latin typeface="Cambria Math" panose="02040503050406030204" pitchFamily="18" charset="0"/>
+                            </a:rPr>
+                            <m:t>𝑖</m:t>
+                          </m:r>
+                          <m:r>
+                            <a:rPr lang="en-US" b="0" i="1" smtClean="0">
+                              <a:latin typeface="Cambria Math" panose="02040503050406030204" pitchFamily="18" charset="0"/>
+                            </a:rPr>
+                            <m:t>,</m:t>
+                          </m:r>
+                          <m:r>
+                            <a:rPr lang="en-US" b="0" i="1" smtClean="0">
+                              <a:latin typeface="Cambria Math" panose="02040503050406030204" pitchFamily="18" charset="0"/>
+                            </a:rPr>
+                            <m:t>𝑘</m:t>
+                          </m:r>
+                        </m:sub>
+                        <m:sup>
+                          <m:r>
+                            <a:rPr lang="en-US" b="0" i="1" smtClean="0">
+                              <a:latin typeface="Cambria Math" panose="02040503050406030204" pitchFamily="18" charset="0"/>
+                            </a:rPr>
+                            <m:t>0</m:t>
+                          </m:r>
+                        </m:sup>
+                      </m:sSubSup>
+                    </m:oMath>
+                  </m:oMathPara>
+                </a14:m>
+                <a:endParaRPr lang="en-US" dirty="0"/>
+              </a:p>
+            </p:txBody>
+          </p:sp>
+        </mc:Choice>
+        <mc:Fallback>
+          <p:sp>
+            <p:nvSpPr>
+              <p:cNvPr id="17" name="TextBox 16">
+                <a:extLst>
+                  <a:ext uri="{FF2B5EF4-FFF2-40B4-BE49-F238E27FC236}">
+                    <a16:creationId xmlns:a16="http://schemas.microsoft.com/office/drawing/2014/main" id="{6AB565C1-9EF2-B04C-930A-970367EF6B63}"/>
+                  </a:ext>
+                </a:extLst>
+              </p:cNvPr>
+              <p:cNvSpPr txBox="1">
+                <a:spLocks noRot="1" noChangeAspect="1" noMove="1" noResize="1" noEditPoints="1" noAdjustHandles="1" noChangeArrowheads="1" noChangeShapeType="1" noTextEdit="1"/>
+              </p:cNvSpPr>
+              <p:nvPr/>
+            </p:nvSpPr>
+            <p:spPr>
+              <a:xfrm>
+                <a:off x="5172538" y="2138057"/>
+                <a:ext cx="1733551" cy="407227"/>
+              </a:xfrm>
+              <a:prstGeom prst="rect">
+                <a:avLst/>
+              </a:prstGeom>
+              <a:blipFill>
+                <a:blip r:embed="rId5"/>
+                <a:stretch>
+                  <a:fillRect/>
+                </a:stretch>
+              </a:blipFill>
+            </p:spPr>
+            <p:txBody>
+              <a:bodyPr/>
+              <a:lstStyle/>
+              <a:p>
+                <a:r>
+                  <a:rPr lang="en-US">
+                    <a:noFill/>
+                  </a:rPr>
+                  <a:t> </a:t>
+                </a:r>
+              </a:p>
+            </p:txBody>
+          </p:sp>
+        </mc:Fallback>
+      </mc:AlternateContent>
       <p:grpSp>
         <p:nvGrpSpPr>
-          <p:cNvPr id="45" name="Group 44">
-            <a:extLst>
-              <a:ext uri="{FF2B5EF4-FFF2-40B4-BE49-F238E27FC236}">
-                <a16:creationId xmlns:a16="http://schemas.microsoft.com/office/drawing/2014/main" id="{26E5433D-FAF4-0543-A9D1-299F389BD44A}"/>
+          <p:cNvPr id="46" name="Group 45">
+            <a:extLst>
+              <a:ext uri="{FF2B5EF4-FFF2-40B4-BE49-F238E27FC236}">
+                <a16:creationId xmlns:a16="http://schemas.microsoft.com/office/drawing/2014/main" id="{43CD5C2E-F170-984D-8455-AD0DA9E46849}"/>
               </a:ext>
             </a:extLst>
           </p:cNvPr>
@@ -4116,635 +4591,14 @@
         </p:nvGrpSpPr>
         <p:grpSpPr>
           <a:xfrm>
-            <a:off x="3889859" y="3730523"/>
-            <a:ext cx="1225014" cy="434478"/>
-            <a:chOff x="5322984" y="3757403"/>
-            <a:chExt cx="1225014" cy="434478"/>
+            <a:off x="6096000" y="4313505"/>
+            <a:ext cx="1495666" cy="842812"/>
+            <a:chOff x="2704315" y="4305365"/>
+            <a:chExt cx="1495666" cy="842812"/>
           </a:xfrm>
         </p:grpSpPr>
-        <mc:AlternateContent xmlns:mc="http://schemas.openxmlformats.org/markup-compatibility/2006">
-          <mc:Choice xmlns:a14="http://schemas.microsoft.com/office/drawing/2010/main" Requires="a14">
-            <p:sp>
-              <p:nvSpPr>
-                <p:cNvPr id="22" name="TextBox 21">
-                  <a:extLst>
-                    <a:ext uri="{FF2B5EF4-FFF2-40B4-BE49-F238E27FC236}">
-                      <a16:creationId xmlns:a16="http://schemas.microsoft.com/office/drawing/2014/main" id="{59293EE5-1F94-A04C-BEA7-BD57B0F5D486}"/>
-                    </a:ext>
-                  </a:extLst>
-                </p:cNvPr>
-                <p:cNvSpPr txBox="1"/>
-                <p:nvPr/>
-              </p:nvSpPr>
-              <p:spPr>
-                <a:xfrm>
-                  <a:off x="5322984" y="3757403"/>
-                  <a:ext cx="1225014" cy="434478"/>
-                </a:xfrm>
-                <a:prstGeom prst="rect">
-                  <a:avLst/>
-                </a:prstGeom>
-                <a:noFill/>
-              </p:spPr>
-              <p:txBody>
-                <a:bodyPr wrap="none" rtlCol="0">
-                  <a:spAutoFit/>
-                </a:bodyPr>
-                <a:lstStyle/>
-                <a:p>
-                  <a14:m>
-                    <m:oMathPara xmlns:m="http://schemas.openxmlformats.org/officeDocument/2006/math">
-                      <m:oMathParaPr>
-                        <m:jc m:val="centerGroup"/>
-                      </m:oMathParaPr>
-                      <m:oMath xmlns:m="http://schemas.openxmlformats.org/officeDocument/2006/math">
-                        <m:sSubSup>
-                          <m:sSubSupPr>
-                            <m:ctrlPr>
-                              <a:rPr lang="en-US" i="1" smtClean="0">
-                                <a:latin typeface="Cambria Math" panose="02040503050406030204" pitchFamily="18" charset="0"/>
-                              </a:rPr>
-                            </m:ctrlPr>
-                          </m:sSubSupPr>
-                          <m:e>
-                            <m:r>
-                              <a:rPr lang="en-US" b="0" i="1" smtClean="0">
-                                <a:latin typeface="Cambria Math" panose="02040503050406030204" pitchFamily="18" charset="0"/>
-                              </a:rPr>
-                              <m:t>𝑃</m:t>
-                            </m:r>
-                          </m:e>
-                          <m:sub>
-                            <m:r>
-                              <a:rPr lang="en-US" b="0" i="1" smtClean="0">
-                                <a:latin typeface="Cambria Math" panose="02040503050406030204" pitchFamily="18" charset="0"/>
-                              </a:rPr>
-                              <m:t>𝑓</m:t>
-                            </m:r>
-                          </m:sub>
-                          <m:sup>
-                            <m:r>
-                              <a:rPr lang="en-US" b="0" i="1" smtClean="0">
-                                <a:latin typeface="Cambria Math" panose="02040503050406030204" pitchFamily="18" charset="0"/>
-                              </a:rPr>
-                              <m:t>𝑔</m:t>
-                            </m:r>
-                          </m:sup>
-                        </m:sSubSup>
-                        <m:r>
-                          <a:rPr lang="en-US" b="0" i="1" smtClean="0">
-                            <a:latin typeface="Cambria Math" panose="02040503050406030204" pitchFamily="18" charset="0"/>
-                          </a:rPr>
-                          <m:t>,</m:t>
-                        </m:r>
-                        <m:sSubSup>
-                          <m:sSubSupPr>
-                            <m:ctrlPr>
-                              <a:rPr lang="en-US" i="1" smtClean="0">
-                                <a:latin typeface="Cambria Math" panose="02040503050406030204" pitchFamily="18" charset="0"/>
-                              </a:rPr>
-                            </m:ctrlPr>
-                          </m:sSubSupPr>
-                          <m:e>
-                            <m:r>
-                              <a:rPr lang="en-US" b="0" i="1" smtClean="0">
-                                <a:latin typeface="Cambria Math" panose="02040503050406030204" pitchFamily="18" charset="0"/>
-                              </a:rPr>
-                              <m:t>𝑄</m:t>
-                            </m:r>
-                          </m:e>
-                          <m:sub>
-                            <m:r>
-                              <a:rPr lang="en-US" b="0" i="1" smtClean="0">
-                                <a:latin typeface="Cambria Math" panose="02040503050406030204" pitchFamily="18" charset="0"/>
-                              </a:rPr>
-                              <m:t>𝑓</m:t>
-                            </m:r>
-                          </m:sub>
-                          <m:sup>
-                            <m:r>
-                              <a:rPr lang="en-US" b="0" i="1" smtClean="0">
-                                <a:latin typeface="Cambria Math" panose="02040503050406030204" pitchFamily="18" charset="0"/>
-                              </a:rPr>
-                              <m:t>𝑔</m:t>
-                            </m:r>
-                          </m:sup>
-                        </m:sSubSup>
-                        <m:r>
-                          <a:rPr lang="en-US" b="0" i="1" smtClean="0">
-                            <a:latin typeface="Cambria Math" panose="02040503050406030204" pitchFamily="18" charset="0"/>
-                          </a:rPr>
-                          <m:t>,</m:t>
-                        </m:r>
-                        <m:r>
-                          <a:rPr lang="en-US" b="0" i="0" smtClean="0">
-                            <a:latin typeface="Cambria Math" panose="02040503050406030204" pitchFamily="18" charset="0"/>
-                          </a:rPr>
-                          <m:t> </m:t>
-                        </m:r>
-                        <m:sSub>
-                          <m:sSubPr>
-                            <m:ctrlPr>
-                              <a:rPr lang="en-US" b="0" i="1" smtClean="0">
-                                <a:latin typeface="Cambria Math" panose="02040503050406030204" pitchFamily="18" charset="0"/>
-                              </a:rPr>
-                            </m:ctrlPr>
-                          </m:sSubPr>
-                          <m:e>
-                            <m:r>
-                              <a:rPr lang="en-US" b="0" i="1" smtClean="0">
-                                <a:latin typeface="Cambria Math" panose="02040503050406030204" pitchFamily="18" charset="0"/>
-                              </a:rPr>
-                              <m:t>𝑅</m:t>
-                            </m:r>
-                          </m:e>
-                          <m:sub>
-                            <m:r>
-                              <a:rPr lang="en-US" b="0" i="1" smtClean="0">
-                                <a:latin typeface="Cambria Math" panose="02040503050406030204" pitchFamily="18" charset="0"/>
-                              </a:rPr>
-                              <m:t>𝑓</m:t>
-                            </m:r>
-                          </m:sub>
-                        </m:sSub>
-                      </m:oMath>
-                    </m:oMathPara>
-                  </a14:m>
-                  <a:endParaRPr lang="en-US" dirty="0"/>
-                </a:p>
-              </p:txBody>
-            </p:sp>
-          </mc:Choice>
-          <mc:Fallback>
-            <p:sp>
-              <p:nvSpPr>
-                <p:cNvPr id="22" name="TextBox 21">
-                  <a:extLst>
-                    <a:ext uri="{FF2B5EF4-FFF2-40B4-BE49-F238E27FC236}">
-                      <a16:creationId xmlns:a16="http://schemas.microsoft.com/office/drawing/2014/main" id="{59293EE5-1F94-A04C-BEA7-BD57B0F5D486}"/>
-                    </a:ext>
-                  </a:extLst>
-                </p:cNvPr>
-                <p:cNvSpPr txBox="1">
-                  <a:spLocks noRot="1" noChangeAspect="1" noMove="1" noResize="1" noEditPoints="1" noAdjustHandles="1" noChangeArrowheads="1" noChangeShapeType="1" noTextEdit="1"/>
-                </p:cNvSpPr>
-                <p:nvPr/>
-              </p:nvSpPr>
-              <p:spPr>
-                <a:xfrm>
-                  <a:off x="5322984" y="3757403"/>
-                  <a:ext cx="1225014" cy="434478"/>
-                </a:xfrm>
-                <a:prstGeom prst="rect">
-                  <a:avLst/>
-                </a:prstGeom>
-                <a:blipFill>
-                  <a:blip r:embed="rId4"/>
-                  <a:stretch>
-                    <a:fillRect b="-8571"/>
-                  </a:stretch>
-                </a:blipFill>
-              </p:spPr>
-              <p:txBody>
-                <a:bodyPr/>
-                <a:lstStyle/>
-                <a:p>
-                  <a:r>
-                    <a:rPr lang="en-US">
-                      <a:noFill/>
-                    </a:rPr>
-                    <a:t> </a:t>
-                  </a:r>
-                </a:p>
-              </p:txBody>
-            </p:sp>
-          </mc:Fallback>
-        </mc:AlternateContent>
-        <p:sp>
-          <p:nvSpPr>
-            <p:cNvPr id="39" name="Rectangle 38">
-              <a:extLst>
-                <a:ext uri="{FF2B5EF4-FFF2-40B4-BE49-F238E27FC236}">
-                  <a16:creationId xmlns:a16="http://schemas.microsoft.com/office/drawing/2014/main" id="{05D9AB24-4FDD-B547-B93B-87E06243BA49}"/>
-                </a:ext>
-              </a:extLst>
-            </p:cNvPr>
-            <p:cNvSpPr/>
-            <p:nvPr/>
-          </p:nvSpPr>
-          <p:spPr>
-            <a:xfrm>
-              <a:off x="5360194" y="3757403"/>
-              <a:ext cx="1150594" cy="434478"/>
-            </a:xfrm>
-            <a:prstGeom prst="rect">
-              <a:avLst/>
-            </a:prstGeom>
-            <a:noFill/>
-            <a:ln w="38100">
-              <a:solidFill>
-                <a:schemeClr val="accent2"/>
-              </a:solidFill>
-              <a:prstDash val="sysDot"/>
-            </a:ln>
-          </p:spPr>
-          <p:style>
-            <a:lnRef idx="2">
-              <a:schemeClr val="accent1">
-                <a:shade val="50000"/>
-              </a:schemeClr>
-            </a:lnRef>
-            <a:fillRef idx="1">
-              <a:schemeClr val="accent1"/>
-            </a:fillRef>
-            <a:effectRef idx="0">
-              <a:schemeClr val="accent1"/>
-            </a:effectRef>
-            <a:fontRef idx="minor">
-              <a:schemeClr val="lt1"/>
-            </a:fontRef>
-          </p:style>
-          <p:txBody>
-            <a:bodyPr rtlCol="0" anchor="ctr"/>
-            <a:lstStyle/>
-            <a:p>
-              <a:pPr algn="ctr"/>
-              <a:endParaRPr lang="en-US"/>
-            </a:p>
-          </p:txBody>
-        </p:sp>
-      </p:grpSp>
-      <p:grpSp>
-        <p:nvGrpSpPr>
-          <p:cNvPr id="44" name="Group 43">
-            <a:extLst>
-              <a:ext uri="{FF2B5EF4-FFF2-40B4-BE49-F238E27FC236}">
-                <a16:creationId xmlns:a16="http://schemas.microsoft.com/office/drawing/2014/main" id="{94CCCC9E-1AD5-D347-A3C6-8DFF291A74B1}"/>
-              </a:ext>
-            </a:extLst>
-          </p:cNvPr>
-          <p:cNvGrpSpPr/>
-          <p:nvPr/>
-        </p:nvGrpSpPr>
-        <p:grpSpPr>
-          <a:xfrm>
-            <a:off x="3397352" y="2194305"/>
-            <a:ext cx="1717521" cy="434478"/>
-            <a:chOff x="5322985" y="2155883"/>
-            <a:chExt cx="1717521" cy="434478"/>
-          </a:xfrm>
-        </p:grpSpPr>
-        <mc:AlternateContent xmlns:mc="http://schemas.openxmlformats.org/markup-compatibility/2006">
-          <mc:Choice xmlns:a14="http://schemas.microsoft.com/office/drawing/2010/main" Requires="a14">
-            <p:sp>
-              <p:nvSpPr>
-                <p:cNvPr id="17" name="TextBox 16">
-                  <a:extLst>
-                    <a:ext uri="{FF2B5EF4-FFF2-40B4-BE49-F238E27FC236}">
-                      <a16:creationId xmlns:a16="http://schemas.microsoft.com/office/drawing/2014/main" id="{6AB565C1-9EF2-B04C-930A-970367EF6B63}"/>
-                    </a:ext>
-                  </a:extLst>
-                </p:cNvPr>
-                <p:cNvSpPr txBox="1"/>
-                <p:nvPr/>
-              </p:nvSpPr>
-              <p:spPr>
-                <a:xfrm>
-                  <a:off x="5322985" y="2177748"/>
-                  <a:ext cx="1717521" cy="390748"/>
-                </a:xfrm>
-                <a:prstGeom prst="rect">
-                  <a:avLst/>
-                </a:prstGeom>
-                <a:noFill/>
-              </p:spPr>
-              <p:txBody>
-                <a:bodyPr wrap="none" rtlCol="0">
-                  <a:spAutoFit/>
-                </a:bodyPr>
-                <a:lstStyle/>
-                <a:p>
-                  <a14:m>
-                    <m:oMathPara xmlns:m="http://schemas.openxmlformats.org/officeDocument/2006/math">
-                      <m:oMathParaPr>
-                        <m:jc m:val="centerGroup"/>
-                      </m:oMathParaPr>
-                      <m:oMath xmlns:m="http://schemas.openxmlformats.org/officeDocument/2006/math">
-                        <m:sSubSup>
-                          <m:sSubSupPr>
-                            <m:ctrlPr>
-                              <a:rPr lang="en-US" i="1" smtClean="0">
-                                <a:latin typeface="Cambria Math" panose="02040503050406030204" pitchFamily="18" charset="0"/>
-                              </a:rPr>
-                            </m:ctrlPr>
-                          </m:sSubSupPr>
-                          <m:e>
-                            <m:r>
-                              <a:rPr lang="en-US" b="0" i="1" smtClean="0">
-                                <a:latin typeface="Cambria Math" panose="02040503050406030204" pitchFamily="18" charset="0"/>
-                              </a:rPr>
-                              <m:t>𝑃</m:t>
-                            </m:r>
-                          </m:e>
-                          <m:sub>
-                            <m:r>
-                              <a:rPr lang="en-US" b="0" i="1" smtClean="0">
-                                <a:latin typeface="Cambria Math" panose="02040503050406030204" pitchFamily="18" charset="0"/>
-                              </a:rPr>
-                              <m:t>𝑖</m:t>
-                            </m:r>
-                            <m:r>
-                              <a:rPr lang="en-US" b="0" i="1" smtClean="0">
-                                <a:latin typeface="Cambria Math" panose="02040503050406030204" pitchFamily="18" charset="0"/>
-                              </a:rPr>
-                              <m:t>,</m:t>
-                            </m:r>
-                            <m:r>
-                              <a:rPr lang="en-US" b="0" i="1" smtClean="0">
-                                <a:latin typeface="Cambria Math" panose="02040503050406030204" pitchFamily="18" charset="0"/>
-                              </a:rPr>
-                              <m:t>𝑘</m:t>
-                            </m:r>
-                          </m:sub>
-                          <m:sup>
-                            <m:r>
-                              <a:rPr lang="en-US" b="0" i="1" smtClean="0">
-                                <a:latin typeface="Cambria Math" panose="02040503050406030204" pitchFamily="18" charset="0"/>
-                              </a:rPr>
-                              <m:t>∗</m:t>
-                            </m:r>
-                          </m:sup>
-                        </m:sSubSup>
-                        <m:r>
-                          <a:rPr lang="en-US" b="0" i="1" smtClean="0">
-                            <a:latin typeface="Cambria Math" panose="02040503050406030204" pitchFamily="18" charset="0"/>
-                          </a:rPr>
-                          <m:t>,</m:t>
-                        </m:r>
-                        <m:sSubSup>
-                          <m:sSubSupPr>
-                            <m:ctrlPr>
-                              <a:rPr lang="en-US" i="1" smtClean="0">
-                                <a:latin typeface="Cambria Math" panose="02040503050406030204" pitchFamily="18" charset="0"/>
-                              </a:rPr>
-                            </m:ctrlPr>
-                          </m:sSubSupPr>
-                          <m:e>
-                            <m:r>
-                              <a:rPr lang="en-US" b="0" i="1" smtClean="0">
-                                <a:latin typeface="Cambria Math" panose="02040503050406030204" pitchFamily="18" charset="0"/>
-                              </a:rPr>
-                              <m:t>𝑄</m:t>
-                            </m:r>
-                          </m:e>
-                          <m:sub>
-                            <m:r>
-                              <a:rPr lang="en-US" b="0" i="1" smtClean="0">
-                                <a:latin typeface="Cambria Math" panose="02040503050406030204" pitchFamily="18" charset="0"/>
-                              </a:rPr>
-                              <m:t>𝑖</m:t>
-                            </m:r>
-                            <m:r>
-                              <a:rPr lang="en-US" b="0" i="1" smtClean="0">
-                                <a:latin typeface="Cambria Math" panose="02040503050406030204" pitchFamily="18" charset="0"/>
-                              </a:rPr>
-                              <m:t>,</m:t>
-                            </m:r>
-                            <m:r>
-                              <a:rPr lang="en-US" b="0" i="1" smtClean="0">
-                                <a:latin typeface="Cambria Math" panose="02040503050406030204" pitchFamily="18" charset="0"/>
-                              </a:rPr>
-                              <m:t>𝑘</m:t>
-                            </m:r>
-                          </m:sub>
-                          <m:sup>
-                            <m:r>
-                              <a:rPr lang="en-US" b="0" i="1" smtClean="0">
-                                <a:latin typeface="Cambria Math" panose="02040503050406030204" pitchFamily="18" charset="0"/>
-                              </a:rPr>
-                              <m:t>∗</m:t>
-                            </m:r>
-                          </m:sup>
-                        </m:sSubSup>
-                        <m:r>
-                          <a:rPr lang="en-US" b="0" i="1" smtClean="0">
-                            <a:latin typeface="Cambria Math" panose="02040503050406030204" pitchFamily="18" charset="0"/>
-                          </a:rPr>
-                          <m:t>,</m:t>
-                        </m:r>
-                        <m:sSubSup>
-                          <m:sSubSupPr>
-                            <m:ctrlPr>
-                              <a:rPr lang="en-US" i="1" smtClean="0">
-                                <a:latin typeface="Cambria Math" panose="02040503050406030204" pitchFamily="18" charset="0"/>
-                              </a:rPr>
-                            </m:ctrlPr>
-                          </m:sSubSupPr>
-                          <m:e>
-                            <m:r>
-                              <a:rPr lang="en-US" b="0" i="1" smtClean="0">
-                                <a:latin typeface="Cambria Math" panose="02040503050406030204" pitchFamily="18" charset="0"/>
-                              </a:rPr>
-                              <m:t>𝑣</m:t>
-                            </m:r>
-                          </m:e>
-                          <m:sub>
-                            <m:r>
-                              <a:rPr lang="en-US" b="0" i="1" smtClean="0">
-                                <a:latin typeface="Cambria Math" panose="02040503050406030204" pitchFamily="18" charset="0"/>
-                              </a:rPr>
-                              <m:t>𝑖</m:t>
-                            </m:r>
-                          </m:sub>
-                          <m:sup>
-                            <m:r>
-                              <a:rPr lang="en-US" b="0" i="1" smtClean="0">
-                                <a:latin typeface="Cambria Math" panose="02040503050406030204" pitchFamily="18" charset="0"/>
-                              </a:rPr>
-                              <m:t>∗</m:t>
-                            </m:r>
-                          </m:sup>
-                        </m:sSubSup>
-                        <m:r>
-                          <a:rPr lang="en-US" b="0" i="1" smtClean="0">
-                            <a:latin typeface="Cambria Math" panose="02040503050406030204" pitchFamily="18" charset="0"/>
-                          </a:rPr>
-                          <m:t>, </m:t>
-                        </m:r>
-                        <m:sSubSup>
-                          <m:sSubSupPr>
-                            <m:ctrlPr>
-                              <a:rPr lang="en-US" i="1" smtClean="0">
-                                <a:latin typeface="Cambria Math" panose="02040503050406030204" pitchFamily="18" charset="0"/>
-                              </a:rPr>
-                            </m:ctrlPr>
-                          </m:sSubSupPr>
-                          <m:e>
-                            <m:r>
-                              <a:rPr lang="en-US" b="0" i="1" smtClean="0">
-                                <a:latin typeface="Cambria Math" panose="02040503050406030204" pitchFamily="18" charset="0"/>
-                              </a:rPr>
-                              <m:t>𝑙</m:t>
-                            </m:r>
-                          </m:e>
-                          <m:sub>
-                            <m:r>
-                              <a:rPr lang="en-US" b="0" i="1" smtClean="0">
-                                <a:latin typeface="Cambria Math" panose="02040503050406030204" pitchFamily="18" charset="0"/>
-                              </a:rPr>
-                              <m:t>𝑖</m:t>
-                            </m:r>
-                            <m:r>
-                              <a:rPr lang="en-US" b="0" i="1" smtClean="0">
-                                <a:latin typeface="Cambria Math" panose="02040503050406030204" pitchFamily="18" charset="0"/>
-                              </a:rPr>
-                              <m:t>,</m:t>
-                            </m:r>
-                            <m:r>
-                              <a:rPr lang="en-US" b="0" i="1" smtClean="0">
-                                <a:latin typeface="Cambria Math" panose="02040503050406030204" pitchFamily="18" charset="0"/>
-                              </a:rPr>
-                              <m:t>𝑘</m:t>
-                            </m:r>
-                          </m:sub>
-                          <m:sup>
-                            <m:r>
-                              <a:rPr lang="en-US" b="0" i="1" smtClean="0">
-                                <a:latin typeface="Cambria Math" panose="02040503050406030204" pitchFamily="18" charset="0"/>
-                              </a:rPr>
-                              <m:t>∗</m:t>
-                            </m:r>
-                          </m:sup>
-                        </m:sSubSup>
-                      </m:oMath>
-                    </m:oMathPara>
-                  </a14:m>
-                  <a:endParaRPr lang="en-US" dirty="0"/>
-                </a:p>
-              </p:txBody>
-            </p:sp>
-          </mc:Choice>
-          <mc:Fallback>
-            <p:sp>
-              <p:nvSpPr>
-                <p:cNvPr id="17" name="TextBox 16">
-                  <a:extLst>
-                    <a:ext uri="{FF2B5EF4-FFF2-40B4-BE49-F238E27FC236}">
-                      <a16:creationId xmlns:a16="http://schemas.microsoft.com/office/drawing/2014/main" id="{6AB565C1-9EF2-B04C-930A-970367EF6B63}"/>
-                    </a:ext>
-                  </a:extLst>
-                </p:cNvPr>
-                <p:cNvSpPr txBox="1">
-                  <a:spLocks noRot="1" noChangeAspect="1" noMove="1" noResize="1" noEditPoints="1" noAdjustHandles="1" noChangeArrowheads="1" noChangeShapeType="1" noTextEdit="1"/>
-                </p:cNvSpPr>
-                <p:nvPr/>
-              </p:nvSpPr>
-              <p:spPr>
-                <a:xfrm>
-                  <a:off x="5322985" y="2177748"/>
-                  <a:ext cx="1717521" cy="390748"/>
-                </a:xfrm>
-                <a:prstGeom prst="rect">
-                  <a:avLst/>
-                </a:prstGeom>
-                <a:blipFill>
-                  <a:blip r:embed="rId5"/>
-                  <a:stretch>
-                    <a:fillRect/>
-                  </a:stretch>
-                </a:blipFill>
-              </p:spPr>
-              <p:txBody>
-                <a:bodyPr/>
-                <a:lstStyle/>
-                <a:p>
-                  <a:r>
-                    <a:rPr lang="en-US">
-                      <a:noFill/>
-                    </a:rPr>
-                    <a:t> </a:t>
-                  </a:r>
-                </a:p>
-              </p:txBody>
-            </p:sp>
-          </mc:Fallback>
-        </mc:AlternateContent>
-        <p:sp>
-          <p:nvSpPr>
-            <p:cNvPr id="40" name="Rectangle 39">
-              <a:extLst>
-                <a:ext uri="{FF2B5EF4-FFF2-40B4-BE49-F238E27FC236}">
-                  <a16:creationId xmlns:a16="http://schemas.microsoft.com/office/drawing/2014/main" id="{B5D2E215-85DF-D44D-9575-5242B6813B30}"/>
-                </a:ext>
-              </a:extLst>
-            </p:cNvPr>
-            <p:cNvSpPr/>
-            <p:nvPr/>
-          </p:nvSpPr>
-          <p:spPr>
-            <a:xfrm>
-              <a:off x="5397403" y="2155883"/>
-              <a:ext cx="1622055" cy="434478"/>
-            </a:xfrm>
-            <a:prstGeom prst="rect">
-              <a:avLst/>
-            </a:prstGeom>
-            <a:noFill/>
-            <a:ln w="38100">
-              <a:solidFill>
-                <a:schemeClr val="accent1"/>
-              </a:solidFill>
-              <a:prstDash val="solid"/>
-            </a:ln>
-          </p:spPr>
-          <p:style>
-            <a:lnRef idx="2">
-              <a:schemeClr val="accent1">
-                <a:shade val="50000"/>
-              </a:schemeClr>
-            </a:lnRef>
-            <a:fillRef idx="1">
-              <a:schemeClr val="accent1"/>
-            </a:fillRef>
-            <a:effectRef idx="0">
-              <a:schemeClr val="accent1"/>
-            </a:effectRef>
-            <a:fontRef idx="minor">
-              <a:schemeClr val="lt1"/>
-            </a:fontRef>
-          </p:style>
-          <p:txBody>
-            <a:bodyPr rtlCol="0" anchor="ctr"/>
-            <a:lstStyle/>
-            <a:p>
-              <a:pPr algn="ctr"/>
-              <a:endParaRPr lang="en-US"/>
-            </a:p>
-          </p:txBody>
-        </p:sp>
-      </p:grpSp>
-      <p:grpSp>
-        <p:nvGrpSpPr>
-          <p:cNvPr id="46" name="Group 45">
-            <a:extLst>
-              <a:ext uri="{FF2B5EF4-FFF2-40B4-BE49-F238E27FC236}">
-                <a16:creationId xmlns:a16="http://schemas.microsoft.com/office/drawing/2014/main" id="{43CD5C2E-F170-984D-8455-AD0DA9E46849}"/>
-              </a:ext>
-            </a:extLst>
-          </p:cNvPr>
-          <p:cNvGrpSpPr/>
-          <p:nvPr/>
-        </p:nvGrpSpPr>
-        <p:grpSpPr>
-          <a:xfrm>
-            <a:off x="2652724" y="4285645"/>
-            <a:ext cx="1622055" cy="862532"/>
-            <a:chOff x="2652724" y="4285645"/>
-            <a:chExt cx="1622055" cy="862532"/>
-          </a:xfrm>
-        </p:grpSpPr>
-        <mc:AlternateContent xmlns:mc="http://schemas.openxmlformats.org/markup-compatibility/2006">
-          <mc:Choice xmlns:a14="http://schemas.microsoft.com/office/drawing/2010/main" Requires="a14">
+        <mc:AlternateContent xmlns:mc="http://schemas.openxmlformats.org/markup-compatibility/2006" xmlns:a14="http://schemas.microsoft.com/office/drawing/2010/main">
+          <mc:Choice Requires="a14">
             <p:sp>
               <p:nvSpPr>
                 <p:cNvPr id="33" name="TextBox 32">
@@ -4940,7 +4794,7 @@
               </p:txBody>
             </p:sp>
           </mc:Choice>
-          <mc:Fallback>
+          <mc:Fallback xmlns="">
             <p:sp>
               <p:nvSpPr>
                 <p:cNvPr id="33" name="TextBox 32">
@@ -4985,8 +4839,8 @@
             </p:sp>
           </mc:Fallback>
         </mc:AlternateContent>
-        <mc:AlternateContent xmlns:mc="http://schemas.openxmlformats.org/markup-compatibility/2006">
-          <mc:Choice xmlns:a14="http://schemas.microsoft.com/office/drawing/2010/main" Requires="a14">
+        <mc:AlternateContent xmlns:mc="http://schemas.openxmlformats.org/markup-compatibility/2006" xmlns:a14="http://schemas.microsoft.com/office/drawing/2010/main">
+          <mc:Choice Requires="a14">
             <p:sp>
               <p:nvSpPr>
                 <p:cNvPr id="36" name="TextBox 35">
@@ -5015,6 +4869,7 @@
                 </a:bodyPr>
                 <a:lstStyle/>
                 <a:p>
+                  <a:pPr/>
                   <a14:m>
                     <m:oMathPara xmlns:m="http://schemas.openxmlformats.org/officeDocument/2006/math">
                       <m:oMathParaPr>
@@ -5054,7 +4909,7 @@
               </p:txBody>
             </p:sp>
           </mc:Choice>
-          <mc:Fallback>
+          <mc:Fallback xmlns="">
             <p:sp>
               <p:nvSpPr>
                 <p:cNvPr id="36" name="TextBox 35">
@@ -5099,64 +4954,1706 @@
             </p:sp>
           </mc:Fallback>
         </mc:AlternateContent>
-        <p:sp>
-          <p:nvSpPr>
-            <p:cNvPr id="41" name="Rectangle 40">
-              <a:extLst>
-                <a:ext uri="{FF2B5EF4-FFF2-40B4-BE49-F238E27FC236}">
-                  <a16:creationId xmlns:a16="http://schemas.microsoft.com/office/drawing/2014/main" id="{1DD8C6EC-02AE-084A-B481-3DC18A744FDD}"/>
-                </a:ext>
-              </a:extLst>
-            </p:cNvPr>
-            <p:cNvSpPr/>
-            <p:nvPr/>
-          </p:nvSpPr>
-          <p:spPr>
-            <a:xfrm>
-              <a:off x="2652724" y="4285645"/>
-              <a:ext cx="1622055" cy="862531"/>
-            </a:xfrm>
-            <a:prstGeom prst="rect">
-              <a:avLst/>
-            </a:prstGeom>
-            <a:noFill/>
-            <a:ln w="38100">
-              <a:solidFill>
-                <a:schemeClr val="accent1"/>
-              </a:solidFill>
-              <a:prstDash val="solid"/>
-            </a:ln>
-          </p:spPr>
-          <p:style>
-            <a:lnRef idx="2">
-              <a:schemeClr val="accent1">
-                <a:shade val="50000"/>
-              </a:schemeClr>
-            </a:lnRef>
-            <a:fillRef idx="1">
-              <a:schemeClr val="accent1"/>
-            </a:fillRef>
-            <a:effectRef idx="0">
-              <a:schemeClr val="accent1"/>
-            </a:effectRef>
-            <a:fontRef idx="minor">
-              <a:schemeClr val="lt1"/>
-            </a:fontRef>
-          </p:style>
-          <p:txBody>
-            <a:bodyPr rtlCol="0" anchor="ctr"/>
-            <a:lstStyle/>
-            <a:p>
-              <a:pPr algn="ctr"/>
-              <a:endParaRPr lang="en-US"/>
-            </a:p>
-          </p:txBody>
-        </p:sp>
       </p:grpSp>
+      <p:sp>
+        <p:nvSpPr>
+          <p:cNvPr id="23" name="Rectangle 22">
+            <a:extLst>
+              <a:ext uri="{FF2B5EF4-FFF2-40B4-BE49-F238E27FC236}">
+                <a16:creationId xmlns:a16="http://schemas.microsoft.com/office/drawing/2014/main" id="{EDB0E468-1888-DF43-83E2-2CF8E6F77509}"/>
+              </a:ext>
+            </a:extLst>
+          </p:cNvPr>
+          <p:cNvSpPr>
+            <a:spLocks noChangeAspect="1"/>
+          </p:cNvSpPr>
+          <p:nvPr/>
+        </p:nvSpPr>
+        <p:spPr>
+          <a:xfrm>
+            <a:off x="1329048" y="2713444"/>
+            <a:ext cx="1645920" cy="914400"/>
+          </a:xfrm>
+          <a:prstGeom prst="rect">
+            <a:avLst/>
+          </a:prstGeom>
+          <a:solidFill>
+            <a:schemeClr val="accent6"/>
+          </a:solidFill>
+        </p:spPr>
+        <p:style>
+          <a:lnRef idx="2">
+            <a:schemeClr val="accent1">
+              <a:shade val="50000"/>
+            </a:schemeClr>
+          </a:lnRef>
+          <a:fillRef idx="1">
+            <a:schemeClr val="accent1"/>
+          </a:fillRef>
+          <a:effectRef idx="0">
+            <a:schemeClr val="accent1"/>
+          </a:effectRef>
+          <a:fontRef idx="minor">
+            <a:schemeClr val="lt1"/>
+          </a:fontRef>
+        </p:style>
+        <p:txBody>
+          <a:bodyPr rtlCol="0" anchor="ctr"/>
+          <a:lstStyle/>
+          <a:p>
+            <a:pPr algn="ctr"/>
+            <a:r>
+              <a:rPr lang="en-US" dirty="0"/>
+              <a:t>FOL</a:t>
+            </a:r>
+          </a:p>
+        </p:txBody>
+      </p:sp>
+      <p:cxnSp>
+        <p:nvCxnSpPr>
+          <p:cNvPr id="7" name="Straight Arrow Connector 6">
+            <a:extLst>
+              <a:ext uri="{FF2B5EF4-FFF2-40B4-BE49-F238E27FC236}">
+                <a16:creationId xmlns:a16="http://schemas.microsoft.com/office/drawing/2014/main" id="{8F6F289F-4039-794A-AE3A-0077EABDD773}"/>
+              </a:ext>
+            </a:extLst>
+          </p:cNvPr>
+          <p:cNvCxnSpPr>
+            <a:cxnSpLocks/>
+            <a:stCxn id="3" idx="1"/>
+            <a:endCxn id="23" idx="3"/>
+          </p:cNvCxnSpPr>
+          <p:nvPr/>
+        </p:nvCxnSpPr>
+        <p:spPr>
+          <a:xfrm flipH="1">
+            <a:off x="2974968" y="3170644"/>
+            <a:ext cx="1374610" cy="0"/>
+          </a:xfrm>
+          <a:prstGeom prst="straightConnector1">
+            <a:avLst/>
+          </a:prstGeom>
+          <a:ln w="63500">
+            <a:solidFill>
+              <a:schemeClr val="tx2"/>
+            </a:solidFill>
+            <a:tailEnd type="triangle"/>
+          </a:ln>
+        </p:spPr>
+        <p:style>
+          <a:lnRef idx="1">
+            <a:schemeClr val="accent1"/>
+          </a:lnRef>
+          <a:fillRef idx="0">
+            <a:schemeClr val="accent1"/>
+          </a:fillRef>
+          <a:effectRef idx="0">
+            <a:schemeClr val="accent1"/>
+          </a:effectRef>
+          <a:fontRef idx="minor">
+            <a:schemeClr val="tx1"/>
+          </a:fontRef>
+        </p:style>
+      </p:cxnSp>
+      <mc:AlternateContent xmlns:mc="http://schemas.openxmlformats.org/markup-compatibility/2006">
+        <mc:Choice xmlns:a14="http://schemas.microsoft.com/office/drawing/2010/main" Requires="a14">
+          <p:sp>
+            <p:nvSpPr>
+              <p:cNvPr id="27" name="TextBox 26">
+                <a:extLst>
+                  <a:ext uri="{FF2B5EF4-FFF2-40B4-BE49-F238E27FC236}">
+                    <a16:creationId xmlns:a16="http://schemas.microsoft.com/office/drawing/2014/main" id="{054EB172-6525-8A41-988C-40CBC1733E68}"/>
+                  </a:ext>
+                </a:extLst>
+              </p:cNvPr>
+              <p:cNvSpPr txBox="1"/>
+              <p:nvPr/>
+            </p:nvSpPr>
+            <p:spPr>
+              <a:xfrm>
+                <a:off x="3080777" y="2724804"/>
+                <a:ext cx="1225014" cy="434478"/>
+              </a:xfrm>
+              <a:prstGeom prst="rect">
+                <a:avLst/>
+              </a:prstGeom>
+              <a:noFill/>
+            </p:spPr>
+            <p:txBody>
+              <a:bodyPr wrap="none" rtlCol="0">
+                <a:spAutoFit/>
+              </a:bodyPr>
+              <a:lstStyle/>
+              <a:p>
+                <a:pPr/>
+                <a14:m>
+                  <m:oMathPara xmlns:m="http://schemas.openxmlformats.org/officeDocument/2006/math">
+                    <m:oMathParaPr>
+                      <m:jc m:val="centerGroup"/>
+                    </m:oMathParaPr>
+                    <m:oMath xmlns:m="http://schemas.openxmlformats.org/officeDocument/2006/math">
+                      <m:sSubSup>
+                        <m:sSubSupPr>
+                          <m:ctrlPr>
+                            <a:rPr lang="en-US" i="1" smtClean="0">
+                              <a:solidFill>
+                                <a:srgbClr val="FF0000"/>
+                              </a:solidFill>
+                              <a:latin typeface="Cambria Math" panose="02040503050406030204" pitchFamily="18" charset="0"/>
+                            </a:rPr>
+                          </m:ctrlPr>
+                        </m:sSubSupPr>
+                        <m:e>
+                          <m:r>
+                            <a:rPr lang="en-US" b="0" i="1" smtClean="0">
+                              <a:solidFill>
+                                <a:srgbClr val="FF0000"/>
+                              </a:solidFill>
+                              <a:latin typeface="Cambria Math" panose="02040503050406030204" pitchFamily="18" charset="0"/>
+                            </a:rPr>
+                            <m:t>𝑃</m:t>
+                          </m:r>
+                        </m:e>
+                        <m:sub>
+                          <m:r>
+                            <a:rPr lang="en-US" b="0" i="1" smtClean="0">
+                              <a:solidFill>
+                                <a:srgbClr val="FF0000"/>
+                              </a:solidFill>
+                              <a:latin typeface="Cambria Math" panose="02040503050406030204" pitchFamily="18" charset="0"/>
+                            </a:rPr>
+                            <m:t>𝑓</m:t>
+                          </m:r>
+                        </m:sub>
+                        <m:sup>
+                          <m:r>
+                            <a:rPr lang="en-US" b="0" i="1" smtClean="0">
+                              <a:solidFill>
+                                <a:srgbClr val="FF0000"/>
+                              </a:solidFill>
+                              <a:latin typeface="Cambria Math" panose="02040503050406030204" pitchFamily="18" charset="0"/>
+                            </a:rPr>
+                            <m:t>𝑔</m:t>
+                          </m:r>
+                        </m:sup>
+                      </m:sSubSup>
+                      <m:r>
+                        <a:rPr lang="en-US" b="0" i="1" smtClean="0">
+                          <a:solidFill>
+                            <a:srgbClr val="FF0000"/>
+                          </a:solidFill>
+                          <a:latin typeface="Cambria Math" panose="02040503050406030204" pitchFamily="18" charset="0"/>
+                        </a:rPr>
+                        <m:t>,</m:t>
+                      </m:r>
+                      <m:sSubSup>
+                        <m:sSubSupPr>
+                          <m:ctrlPr>
+                            <a:rPr lang="en-US" i="1" smtClean="0">
+                              <a:solidFill>
+                                <a:srgbClr val="FF0000"/>
+                              </a:solidFill>
+                              <a:latin typeface="Cambria Math" panose="02040503050406030204" pitchFamily="18" charset="0"/>
+                            </a:rPr>
+                          </m:ctrlPr>
+                        </m:sSubSupPr>
+                        <m:e>
+                          <m:r>
+                            <a:rPr lang="en-US" b="0" i="1" smtClean="0">
+                              <a:solidFill>
+                                <a:srgbClr val="FF0000"/>
+                              </a:solidFill>
+                              <a:latin typeface="Cambria Math" panose="02040503050406030204" pitchFamily="18" charset="0"/>
+                            </a:rPr>
+                            <m:t>𝑄</m:t>
+                          </m:r>
+                        </m:e>
+                        <m:sub>
+                          <m:r>
+                            <a:rPr lang="en-US" b="0" i="1" smtClean="0">
+                              <a:solidFill>
+                                <a:srgbClr val="FF0000"/>
+                              </a:solidFill>
+                              <a:latin typeface="Cambria Math" panose="02040503050406030204" pitchFamily="18" charset="0"/>
+                            </a:rPr>
+                            <m:t>𝑓</m:t>
+                          </m:r>
+                        </m:sub>
+                        <m:sup>
+                          <m:r>
+                            <a:rPr lang="en-US" b="0" i="1" smtClean="0">
+                              <a:solidFill>
+                                <a:srgbClr val="FF0000"/>
+                              </a:solidFill>
+                              <a:latin typeface="Cambria Math" panose="02040503050406030204" pitchFamily="18" charset="0"/>
+                            </a:rPr>
+                            <m:t>𝑔</m:t>
+                          </m:r>
+                        </m:sup>
+                      </m:sSubSup>
+                      <m:r>
+                        <a:rPr lang="en-US" b="0" i="1" smtClean="0">
+                          <a:solidFill>
+                            <a:srgbClr val="FF0000"/>
+                          </a:solidFill>
+                          <a:latin typeface="Cambria Math" panose="02040503050406030204" pitchFamily="18" charset="0"/>
+                        </a:rPr>
+                        <m:t>,</m:t>
+                      </m:r>
+                      <m:r>
+                        <a:rPr lang="en-US" b="0" i="0" smtClean="0">
+                          <a:solidFill>
+                            <a:srgbClr val="FF0000"/>
+                          </a:solidFill>
+                          <a:latin typeface="Cambria Math" panose="02040503050406030204" pitchFamily="18" charset="0"/>
+                        </a:rPr>
+                        <m:t> </m:t>
+                      </m:r>
+                      <m:sSub>
+                        <m:sSubPr>
+                          <m:ctrlPr>
+                            <a:rPr lang="en-US" b="0" i="1" smtClean="0">
+                              <a:solidFill>
+                                <a:srgbClr val="FF0000"/>
+                              </a:solidFill>
+                              <a:latin typeface="Cambria Math" panose="02040503050406030204" pitchFamily="18" charset="0"/>
+                            </a:rPr>
+                          </m:ctrlPr>
+                        </m:sSubPr>
+                        <m:e>
+                          <m:r>
+                            <a:rPr lang="en-US" b="0" i="1" smtClean="0">
+                              <a:solidFill>
+                                <a:srgbClr val="FF0000"/>
+                              </a:solidFill>
+                              <a:latin typeface="Cambria Math" panose="02040503050406030204" pitchFamily="18" charset="0"/>
+                            </a:rPr>
+                            <m:t>𝑅</m:t>
+                          </m:r>
+                        </m:e>
+                        <m:sub>
+                          <m:r>
+                            <a:rPr lang="en-US" b="0" i="1" smtClean="0">
+                              <a:solidFill>
+                                <a:srgbClr val="FF0000"/>
+                              </a:solidFill>
+                              <a:latin typeface="Cambria Math" panose="02040503050406030204" pitchFamily="18" charset="0"/>
+                            </a:rPr>
+                            <m:t>𝑓</m:t>
+                          </m:r>
+                        </m:sub>
+                      </m:sSub>
+                    </m:oMath>
+                  </m:oMathPara>
+                </a14:m>
+                <a:endParaRPr lang="en-US" dirty="0">
+                  <a:solidFill>
+                    <a:srgbClr val="FF0000"/>
+                  </a:solidFill>
+                </a:endParaRPr>
+              </a:p>
+            </p:txBody>
+          </p:sp>
+        </mc:Choice>
+        <mc:Fallback>
+          <p:sp>
+            <p:nvSpPr>
+              <p:cNvPr id="27" name="TextBox 26">
+                <a:extLst>
+                  <a:ext uri="{FF2B5EF4-FFF2-40B4-BE49-F238E27FC236}">
+                    <a16:creationId xmlns:a16="http://schemas.microsoft.com/office/drawing/2014/main" id="{054EB172-6525-8A41-988C-40CBC1733E68}"/>
+                  </a:ext>
+                </a:extLst>
+              </p:cNvPr>
+              <p:cNvSpPr txBox="1">
+                <a:spLocks noRot="1" noChangeAspect="1" noMove="1" noResize="1" noEditPoints="1" noAdjustHandles="1" noChangeArrowheads="1" noChangeShapeType="1" noTextEdit="1"/>
+              </p:cNvSpPr>
+              <p:nvPr/>
+            </p:nvSpPr>
+            <p:spPr>
+              <a:xfrm>
+                <a:off x="3080777" y="2724804"/>
+                <a:ext cx="1225014" cy="434478"/>
+              </a:xfrm>
+              <a:prstGeom prst="rect">
+                <a:avLst/>
+              </a:prstGeom>
+              <a:blipFill>
+                <a:blip r:embed="rId8"/>
+                <a:stretch>
+                  <a:fillRect b="-8571"/>
+                </a:stretch>
+              </a:blipFill>
+            </p:spPr>
+            <p:txBody>
+              <a:bodyPr/>
+              <a:lstStyle/>
+              <a:p>
+                <a:r>
+                  <a:rPr lang="en-US">
+                    <a:noFill/>
+                  </a:rPr>
+                  <a:t> </a:t>
+                </a:r>
+              </a:p>
+            </p:txBody>
+          </p:sp>
+        </mc:Fallback>
+      </mc:AlternateContent>
+      <p:cxnSp>
+        <p:nvCxnSpPr>
+          <p:cNvPr id="26" name="Elbow Connector 25">
+            <a:extLst>
+              <a:ext uri="{FF2B5EF4-FFF2-40B4-BE49-F238E27FC236}">
+                <a16:creationId xmlns:a16="http://schemas.microsoft.com/office/drawing/2014/main" id="{A45D8256-B6E2-AD42-92A7-70252ACFE535}"/>
+              </a:ext>
+            </a:extLst>
+          </p:cNvPr>
+          <p:cNvCxnSpPr>
+            <a:cxnSpLocks/>
+            <a:stCxn id="23" idx="0"/>
+            <a:endCxn id="2" idx="1"/>
+          </p:cNvCxnSpPr>
+          <p:nvPr/>
+        </p:nvCxnSpPr>
+        <p:spPr>
+          <a:xfrm rot="5400000" flipH="1" flipV="1">
+            <a:off x="2697260" y="1061126"/>
+            <a:ext cx="1107066" cy="2197570"/>
+          </a:xfrm>
+          <a:prstGeom prst="bentConnector2">
+            <a:avLst/>
+          </a:prstGeom>
+          <a:ln w="63500">
+            <a:solidFill>
+              <a:schemeClr val="tx2"/>
+            </a:solidFill>
+            <a:tailEnd type="triangle"/>
+          </a:ln>
+        </p:spPr>
+        <p:style>
+          <a:lnRef idx="1">
+            <a:schemeClr val="accent1"/>
+          </a:lnRef>
+          <a:fillRef idx="0">
+            <a:schemeClr val="accent1"/>
+          </a:fillRef>
+          <a:effectRef idx="0">
+            <a:schemeClr val="accent1"/>
+          </a:effectRef>
+          <a:fontRef idx="minor">
+            <a:schemeClr val="tx1"/>
+          </a:fontRef>
+        </p:style>
+      </p:cxnSp>
+      <p:sp>
+        <p:nvSpPr>
+          <p:cNvPr id="48" name="Rectangle 47">
+            <a:extLst>
+              <a:ext uri="{FF2B5EF4-FFF2-40B4-BE49-F238E27FC236}">
+                <a16:creationId xmlns:a16="http://schemas.microsoft.com/office/drawing/2014/main" id="{F3E64154-63E9-5F41-997F-36B50D8C6F05}"/>
+              </a:ext>
+            </a:extLst>
+          </p:cNvPr>
+          <p:cNvSpPr>
+            <a:spLocks noChangeAspect="1"/>
+          </p:cNvSpPr>
+          <p:nvPr/>
+        </p:nvSpPr>
+        <p:spPr>
+          <a:xfrm>
+            <a:off x="7834184" y="4277711"/>
+            <a:ext cx="1645920" cy="914400"/>
+          </a:xfrm>
+          <a:prstGeom prst="rect">
+            <a:avLst/>
+          </a:prstGeom>
+          <a:solidFill>
+            <a:srgbClr val="00B0F0"/>
+          </a:solidFill>
+        </p:spPr>
+        <p:style>
+          <a:lnRef idx="2">
+            <a:schemeClr val="accent1">
+              <a:shade val="50000"/>
+            </a:schemeClr>
+          </a:lnRef>
+          <a:fillRef idx="1">
+            <a:schemeClr val="accent1"/>
+          </a:fillRef>
+          <a:effectRef idx="0">
+            <a:schemeClr val="accent1"/>
+          </a:effectRef>
+          <a:fontRef idx="minor">
+            <a:schemeClr val="lt1"/>
+          </a:fontRef>
+        </p:style>
+        <p:txBody>
+          <a:bodyPr rtlCol="0" anchor="ctr"/>
+          <a:lstStyle/>
+          <a:p>
+            <a:pPr algn="ctr"/>
+            <a:r>
+              <a:rPr lang="en-US" dirty="0"/>
+              <a:t>Markets</a:t>
+            </a:r>
+          </a:p>
+        </p:txBody>
+      </p:sp>
+      <p:cxnSp>
+        <p:nvCxnSpPr>
+          <p:cNvPr id="50" name="Elbow Connector 49">
+            <a:extLst>
+              <a:ext uri="{FF2B5EF4-FFF2-40B4-BE49-F238E27FC236}">
+                <a16:creationId xmlns:a16="http://schemas.microsoft.com/office/drawing/2014/main" id="{88BD303F-B28A-A34E-B3E7-59C3A40D2C69}"/>
+              </a:ext>
+            </a:extLst>
+          </p:cNvPr>
+          <p:cNvCxnSpPr>
+            <a:cxnSpLocks/>
+            <a:stCxn id="48" idx="0"/>
+            <a:endCxn id="3" idx="3"/>
+          </p:cNvCxnSpPr>
+          <p:nvPr/>
+        </p:nvCxnSpPr>
+        <p:spPr>
+          <a:xfrm rot="16200000" flipV="1">
+            <a:off x="6772788" y="2393355"/>
+            <a:ext cx="1107067" cy="2661646"/>
+          </a:xfrm>
+          <a:prstGeom prst="bentConnector2">
+            <a:avLst/>
+          </a:prstGeom>
+          <a:ln w="63500">
+            <a:solidFill>
+              <a:schemeClr val="tx2"/>
+            </a:solidFill>
+            <a:tailEnd type="triangle"/>
+          </a:ln>
+        </p:spPr>
+        <p:style>
+          <a:lnRef idx="1">
+            <a:schemeClr val="accent1"/>
+          </a:lnRef>
+          <a:fillRef idx="0">
+            <a:schemeClr val="accent1"/>
+          </a:fillRef>
+          <a:effectRef idx="0">
+            <a:schemeClr val="accent1"/>
+          </a:effectRef>
+          <a:fontRef idx="minor">
+            <a:schemeClr val="tx1"/>
+          </a:fontRef>
+        </p:style>
+      </p:cxnSp>
+      <mc:AlternateContent xmlns:mc="http://schemas.openxmlformats.org/markup-compatibility/2006">
+        <mc:Choice xmlns:a14="http://schemas.microsoft.com/office/drawing/2010/main" Requires="a14">
+          <p:sp>
+            <p:nvSpPr>
+              <p:cNvPr id="59" name="TextBox 58">
+                <a:extLst>
+                  <a:ext uri="{FF2B5EF4-FFF2-40B4-BE49-F238E27FC236}">
+                    <a16:creationId xmlns:a16="http://schemas.microsoft.com/office/drawing/2014/main" id="{CC06E0D7-D07F-3C4F-8E2D-0088EF680304}"/>
+                  </a:ext>
+                </a:extLst>
+              </p:cNvPr>
+              <p:cNvSpPr txBox="1"/>
+              <p:nvPr/>
+            </p:nvSpPr>
+            <p:spPr>
+              <a:xfrm>
+                <a:off x="6843833" y="2758427"/>
+                <a:ext cx="1193725" cy="374270"/>
+              </a:xfrm>
+              <a:prstGeom prst="rect">
+                <a:avLst/>
+              </a:prstGeom>
+              <a:noFill/>
+            </p:spPr>
+            <p:txBody>
+              <a:bodyPr wrap="none" rtlCol="0">
+                <a:spAutoFit/>
+              </a:bodyPr>
+              <a:lstStyle/>
+              <a:p>
+                <a:pPr/>
+                <a14:m>
+                  <m:oMathPara xmlns:m="http://schemas.openxmlformats.org/officeDocument/2006/math">
+                    <m:oMathParaPr>
+                      <m:jc m:val="centerGroup"/>
+                    </m:oMathParaPr>
+                    <m:oMath xmlns:m="http://schemas.openxmlformats.org/officeDocument/2006/math">
+                      <m:sSup>
+                        <m:sSupPr>
+                          <m:ctrlPr>
+                            <a:rPr lang="en-US" i="1" smtClean="0">
+                              <a:solidFill>
+                                <a:schemeClr val="accent5">
+                                  <a:lumMod val="75000"/>
+                                </a:schemeClr>
+                              </a:solidFill>
+                              <a:latin typeface="Cambria Math" panose="02040503050406030204" pitchFamily="18" charset="0"/>
+                            </a:rPr>
+                          </m:ctrlPr>
+                        </m:sSupPr>
+                        <m:e>
+                          <m:r>
+                            <a:rPr lang="en-US" i="1">
+                              <a:solidFill>
+                                <a:schemeClr val="accent5">
+                                  <a:lumMod val="75000"/>
+                                </a:schemeClr>
+                              </a:solidFill>
+                              <a:latin typeface="Cambria Math" panose="02040503050406030204" pitchFamily="18" charset="0"/>
+                              <a:ea typeface="Cambria Math" panose="02040503050406030204" pitchFamily="18" charset="0"/>
+                            </a:rPr>
+                            <m:t>𝜆</m:t>
+                          </m:r>
+                        </m:e>
+                        <m:sup>
+                          <m:r>
+                            <a:rPr lang="en-US" b="0" i="1" smtClean="0">
+                              <a:solidFill>
+                                <a:schemeClr val="accent5">
+                                  <a:lumMod val="75000"/>
+                                </a:schemeClr>
+                              </a:solidFill>
+                              <a:latin typeface="Cambria Math" panose="02040503050406030204" pitchFamily="18" charset="0"/>
+                            </a:rPr>
+                            <m:t>𝑟𝑡</m:t>
+                          </m:r>
+                        </m:sup>
+                      </m:sSup>
+                      <m:r>
+                        <a:rPr lang="en-US" b="0" i="1" smtClean="0">
+                          <a:solidFill>
+                            <a:schemeClr val="accent5">
+                              <a:lumMod val="75000"/>
+                            </a:schemeClr>
+                          </a:solidFill>
+                          <a:latin typeface="Cambria Math" panose="02040503050406030204" pitchFamily="18" charset="0"/>
+                        </a:rPr>
+                        <m:t>,</m:t>
+                      </m:r>
+                      <m:sSup>
+                        <m:sSupPr>
+                          <m:ctrlPr>
+                            <a:rPr lang="en-US" i="1">
+                              <a:solidFill>
+                                <a:schemeClr val="accent5">
+                                  <a:lumMod val="75000"/>
+                                </a:schemeClr>
+                              </a:solidFill>
+                              <a:latin typeface="Cambria Math" panose="02040503050406030204" pitchFamily="18" charset="0"/>
+                            </a:rPr>
+                          </m:ctrlPr>
+                        </m:sSupPr>
+                        <m:e>
+                          <m:r>
+                            <a:rPr lang="en-US" i="1">
+                              <a:solidFill>
+                                <a:schemeClr val="accent5">
+                                  <a:lumMod val="75000"/>
+                                </a:schemeClr>
+                              </a:solidFill>
+                              <a:latin typeface="Cambria Math" panose="02040503050406030204" pitchFamily="18" charset="0"/>
+                              <a:ea typeface="Cambria Math" panose="02040503050406030204" pitchFamily="18" charset="0"/>
+                            </a:rPr>
+                            <m:t>𝜆</m:t>
+                          </m:r>
+                        </m:e>
+                        <m:sup>
+                          <m:r>
+                            <a:rPr lang="en-US" b="0" i="1" smtClean="0">
+                              <a:solidFill>
+                                <a:schemeClr val="accent5">
+                                  <a:lumMod val="75000"/>
+                                </a:schemeClr>
+                              </a:solidFill>
+                              <a:latin typeface="Cambria Math" panose="02040503050406030204" pitchFamily="18" charset="0"/>
+                              <a:ea typeface="Cambria Math" panose="02040503050406030204" pitchFamily="18" charset="0"/>
+                            </a:rPr>
+                            <m:t>𝑑𝑎</m:t>
+                          </m:r>
+                        </m:sup>
+                      </m:sSup>
+                      <m:r>
+                        <a:rPr lang="en-US" b="0" i="1" smtClean="0">
+                          <a:solidFill>
+                            <a:schemeClr val="accent5">
+                              <a:lumMod val="75000"/>
+                            </a:schemeClr>
+                          </a:solidFill>
+                          <a:latin typeface="Cambria Math" panose="02040503050406030204" pitchFamily="18" charset="0"/>
+                        </a:rPr>
+                        <m:t>, </m:t>
+                      </m:r>
+                      <m:r>
+                        <a:rPr lang="en-US" b="0" i="1" smtClean="0">
+                          <a:solidFill>
+                            <a:schemeClr val="accent5">
+                              <a:lumMod val="75000"/>
+                            </a:schemeClr>
+                          </a:solidFill>
+                          <a:latin typeface="Cambria Math" panose="02040503050406030204" pitchFamily="18" charset="0"/>
+                          <a:ea typeface="Cambria Math" panose="02040503050406030204" pitchFamily="18" charset="0"/>
+                        </a:rPr>
+                        <m:t>𝛼</m:t>
+                      </m:r>
+                    </m:oMath>
+                  </m:oMathPara>
+                </a14:m>
+                <a:endParaRPr lang="en-US" dirty="0">
+                  <a:solidFill>
+                    <a:schemeClr val="accent5">
+                      <a:lumMod val="75000"/>
+                    </a:schemeClr>
+                  </a:solidFill>
+                </a:endParaRPr>
+              </a:p>
+            </p:txBody>
+          </p:sp>
+        </mc:Choice>
+        <mc:Fallback>
+          <p:sp>
+            <p:nvSpPr>
+              <p:cNvPr id="59" name="TextBox 58">
+                <a:extLst>
+                  <a:ext uri="{FF2B5EF4-FFF2-40B4-BE49-F238E27FC236}">
+                    <a16:creationId xmlns:a16="http://schemas.microsoft.com/office/drawing/2014/main" id="{CC06E0D7-D07F-3C4F-8E2D-0088EF680304}"/>
+                  </a:ext>
+                </a:extLst>
+              </p:cNvPr>
+              <p:cNvSpPr txBox="1">
+                <a:spLocks noRot="1" noChangeAspect="1" noMove="1" noResize="1" noEditPoints="1" noAdjustHandles="1" noChangeArrowheads="1" noChangeShapeType="1" noTextEdit="1"/>
+              </p:cNvSpPr>
+              <p:nvPr/>
+            </p:nvSpPr>
+            <p:spPr>
+              <a:xfrm>
+                <a:off x="6843833" y="2758427"/>
+                <a:ext cx="1193725" cy="374270"/>
+              </a:xfrm>
+              <a:prstGeom prst="rect">
+                <a:avLst/>
+              </a:prstGeom>
+              <a:blipFill>
+                <a:blip r:embed="rId9"/>
+                <a:stretch>
+                  <a:fillRect/>
+                </a:stretch>
+              </a:blipFill>
+            </p:spPr>
+            <p:txBody>
+              <a:bodyPr/>
+              <a:lstStyle/>
+              <a:p>
+                <a:r>
+                  <a:rPr lang="en-US">
+                    <a:noFill/>
+                  </a:rPr>
+                  <a:t> </a:t>
+                </a:r>
+              </a:p>
+            </p:txBody>
+          </p:sp>
+        </mc:Fallback>
+      </mc:AlternateContent>
     </p:spTree>
     <p:extLst>
       <p:ext uri="{BB962C8B-B14F-4D97-AF65-F5344CB8AC3E}">
         <p14:creationId xmlns:p14="http://schemas.microsoft.com/office/powerpoint/2010/main" val="1968000712"/>
+      </p:ext>
+    </p:extLst>
+  </p:cSld>
+  <p:clrMapOvr>
+    <a:masterClrMapping/>
+  </p:clrMapOvr>
+</p:sld>
+</file>
+
+<file path=ppt/slides/slide3.xml><?xml version="1.0" encoding="utf-8"?>
+<p:sld xmlns:a="http://schemas.openxmlformats.org/drawingml/2006/main" xmlns:r="http://schemas.openxmlformats.org/officeDocument/2006/relationships" xmlns:p="http://schemas.openxmlformats.org/presentationml/2006/main">
+  <p:cSld>
+    <p:spTree>
+      <p:nvGrpSpPr>
+        <p:cNvPr id="1" name=""/>
+        <p:cNvGrpSpPr/>
+        <p:nvPr/>
+      </p:nvGrpSpPr>
+      <p:grpSpPr>
+        <a:xfrm>
+          <a:off x="0" y="0"/>
+          <a:ext cx="0" cy="0"/>
+          <a:chOff x="0" y="0"/>
+          <a:chExt cx="0" cy="0"/>
+        </a:xfrm>
+      </p:grpSpPr>
+      <p:sp>
+        <p:nvSpPr>
+          <p:cNvPr id="2" name="Rectangle 1">
+            <a:extLst>
+              <a:ext uri="{FF2B5EF4-FFF2-40B4-BE49-F238E27FC236}">
+                <a16:creationId xmlns:a16="http://schemas.microsoft.com/office/drawing/2014/main" id="{9D92246A-4837-9F48-9C33-A13643F446A3}"/>
+              </a:ext>
+            </a:extLst>
+          </p:cNvPr>
+          <p:cNvSpPr>
+            <a:spLocks noChangeAspect="1"/>
+          </p:cNvSpPr>
+          <p:nvPr/>
+        </p:nvSpPr>
+        <p:spPr>
+          <a:xfrm>
+            <a:off x="4450080" y="2178446"/>
+            <a:ext cx="1645920" cy="914400"/>
+          </a:xfrm>
+          <a:prstGeom prst="rect">
+            <a:avLst/>
+          </a:prstGeom>
+          <a:solidFill>
+            <a:schemeClr val="accent2"/>
+          </a:solidFill>
+        </p:spPr>
+        <p:style>
+          <a:lnRef idx="2">
+            <a:schemeClr val="accent1">
+              <a:shade val="50000"/>
+            </a:schemeClr>
+          </a:lnRef>
+          <a:fillRef idx="1">
+            <a:schemeClr val="accent1"/>
+          </a:fillRef>
+          <a:effectRef idx="0">
+            <a:schemeClr val="accent1"/>
+          </a:effectRef>
+          <a:fontRef idx="minor">
+            <a:schemeClr val="lt1"/>
+          </a:fontRef>
+        </p:style>
+        <p:txBody>
+          <a:bodyPr rtlCol="0" anchor="ctr"/>
+          <a:lstStyle/>
+          <a:p>
+            <a:pPr algn="ctr"/>
+            <a:r>
+              <a:rPr lang="en-US" dirty="0"/>
+              <a:t>GML</a:t>
+            </a:r>
+          </a:p>
+        </p:txBody>
+      </p:sp>
+      <p:sp>
+        <p:nvSpPr>
+          <p:cNvPr id="3" name="Rectangle 2">
+            <a:extLst>
+              <a:ext uri="{FF2B5EF4-FFF2-40B4-BE49-F238E27FC236}">
+                <a16:creationId xmlns:a16="http://schemas.microsoft.com/office/drawing/2014/main" id="{E863B921-E767-074D-996C-D11140099C9B}"/>
+              </a:ext>
+            </a:extLst>
+          </p:cNvPr>
+          <p:cNvSpPr>
+            <a:spLocks noChangeAspect="1"/>
+          </p:cNvSpPr>
+          <p:nvPr/>
+        </p:nvSpPr>
+        <p:spPr>
+          <a:xfrm>
+            <a:off x="4450080" y="3676135"/>
+            <a:ext cx="1645920" cy="914400"/>
+          </a:xfrm>
+          <a:prstGeom prst="rect">
+            <a:avLst/>
+          </a:prstGeom>
+          <a:solidFill>
+            <a:schemeClr val="accent6"/>
+          </a:solidFill>
+          <a:ln>
+            <a:solidFill>
+              <a:schemeClr val="tx1"/>
+            </a:solidFill>
+          </a:ln>
+        </p:spPr>
+        <p:style>
+          <a:lnRef idx="2">
+            <a:schemeClr val="accent1">
+              <a:shade val="50000"/>
+            </a:schemeClr>
+          </a:lnRef>
+          <a:fillRef idx="1">
+            <a:schemeClr val="accent1"/>
+          </a:fillRef>
+          <a:effectRef idx="0">
+            <a:schemeClr val="accent1"/>
+          </a:effectRef>
+          <a:fontRef idx="minor">
+            <a:schemeClr val="lt1"/>
+          </a:fontRef>
+        </p:style>
+        <p:txBody>
+          <a:bodyPr rtlCol="0" anchor="ctr"/>
+          <a:lstStyle/>
+          <a:p>
+            <a:pPr algn="ctr"/>
+            <a:r>
+              <a:rPr lang="en-US" dirty="0"/>
+              <a:t>FOL</a:t>
+            </a:r>
+          </a:p>
+        </p:txBody>
+      </p:sp>
+      <p:sp>
+        <p:nvSpPr>
+          <p:cNvPr id="4" name="Rectangle 3">
+            <a:extLst>
+              <a:ext uri="{FF2B5EF4-FFF2-40B4-BE49-F238E27FC236}">
+                <a16:creationId xmlns:a16="http://schemas.microsoft.com/office/drawing/2014/main" id="{5F15F390-D2D4-9D48-AE8F-E95F2478C5A4}"/>
+              </a:ext>
+            </a:extLst>
+          </p:cNvPr>
+          <p:cNvSpPr>
+            <a:spLocks noChangeAspect="1"/>
+          </p:cNvSpPr>
+          <p:nvPr/>
+        </p:nvSpPr>
+        <p:spPr>
+          <a:xfrm>
+            <a:off x="4450080" y="5173824"/>
+            <a:ext cx="1645920" cy="914400"/>
+          </a:xfrm>
+          <a:prstGeom prst="rect">
+            <a:avLst/>
+          </a:prstGeom>
+          <a:solidFill>
+            <a:srgbClr val="FFC000"/>
+          </a:solidFill>
+        </p:spPr>
+        <p:style>
+          <a:lnRef idx="2">
+            <a:schemeClr val="accent1">
+              <a:shade val="50000"/>
+            </a:schemeClr>
+          </a:lnRef>
+          <a:fillRef idx="1">
+            <a:schemeClr val="accent1"/>
+          </a:fillRef>
+          <a:effectRef idx="0">
+            <a:schemeClr val="accent1"/>
+          </a:effectRef>
+          <a:fontRef idx="minor">
+            <a:schemeClr val="lt1"/>
+          </a:fontRef>
+        </p:style>
+        <p:txBody>
+          <a:bodyPr rtlCol="0" anchor="ctr"/>
+          <a:lstStyle/>
+          <a:p>
+            <a:pPr algn="ctr"/>
+            <a:r>
+              <a:rPr lang="en-US" dirty="0"/>
+              <a:t>STL</a:t>
+            </a:r>
+          </a:p>
+        </p:txBody>
+      </p:sp>
+      <p:cxnSp>
+        <p:nvCxnSpPr>
+          <p:cNvPr id="6" name="Straight Arrow Connector 5">
+            <a:extLst>
+              <a:ext uri="{FF2B5EF4-FFF2-40B4-BE49-F238E27FC236}">
+                <a16:creationId xmlns:a16="http://schemas.microsoft.com/office/drawing/2014/main" id="{B8C47748-A420-2D47-9120-CF8EA278752B}"/>
+              </a:ext>
+            </a:extLst>
+          </p:cNvPr>
+          <p:cNvCxnSpPr>
+            <a:stCxn id="2" idx="2"/>
+            <a:endCxn id="3" idx="0"/>
+          </p:cNvCxnSpPr>
+          <p:nvPr/>
+        </p:nvCxnSpPr>
+        <p:spPr>
+          <a:xfrm>
+            <a:off x="5273040" y="3092846"/>
+            <a:ext cx="0" cy="583289"/>
+          </a:xfrm>
+          <a:prstGeom prst="straightConnector1">
+            <a:avLst/>
+          </a:prstGeom>
+          <a:ln w="63500">
+            <a:headEnd type="triangle"/>
+            <a:tailEnd type="triangle"/>
+          </a:ln>
+        </p:spPr>
+        <p:style>
+          <a:lnRef idx="1">
+            <a:schemeClr val="accent1"/>
+          </a:lnRef>
+          <a:fillRef idx="0">
+            <a:schemeClr val="accent1"/>
+          </a:fillRef>
+          <a:effectRef idx="0">
+            <a:schemeClr val="accent1"/>
+          </a:effectRef>
+          <a:fontRef idx="minor">
+            <a:schemeClr val="tx1"/>
+          </a:fontRef>
+        </p:style>
+      </p:cxnSp>
+      <p:cxnSp>
+        <p:nvCxnSpPr>
+          <p:cNvPr id="8" name="Straight Arrow Connector 7">
+            <a:extLst>
+              <a:ext uri="{FF2B5EF4-FFF2-40B4-BE49-F238E27FC236}">
+                <a16:creationId xmlns:a16="http://schemas.microsoft.com/office/drawing/2014/main" id="{1A34E000-8F75-5E45-B0AB-BE383DAEC888}"/>
+              </a:ext>
+            </a:extLst>
+          </p:cNvPr>
+          <p:cNvCxnSpPr/>
+          <p:nvPr/>
+        </p:nvCxnSpPr>
+        <p:spPr>
+          <a:xfrm>
+            <a:off x="5284573" y="4590535"/>
+            <a:ext cx="0" cy="583289"/>
+          </a:xfrm>
+          <a:prstGeom prst="straightConnector1">
+            <a:avLst/>
+          </a:prstGeom>
+          <a:ln w="63500">
+            <a:headEnd type="triangle"/>
+            <a:tailEnd type="triangle"/>
+          </a:ln>
+        </p:spPr>
+        <p:style>
+          <a:lnRef idx="1">
+            <a:schemeClr val="accent1"/>
+          </a:lnRef>
+          <a:fillRef idx="0">
+            <a:schemeClr val="accent1"/>
+          </a:fillRef>
+          <a:effectRef idx="0">
+            <a:schemeClr val="accent1"/>
+          </a:effectRef>
+          <a:fontRef idx="minor">
+            <a:schemeClr val="tx1"/>
+          </a:fontRef>
+        </p:style>
+      </p:cxnSp>
+      <p:sp>
+        <p:nvSpPr>
+          <p:cNvPr id="9" name="Rectangle 8">
+            <a:extLst>
+              <a:ext uri="{FF2B5EF4-FFF2-40B4-BE49-F238E27FC236}">
+                <a16:creationId xmlns:a16="http://schemas.microsoft.com/office/drawing/2014/main" id="{41CA43AC-0493-4B43-A401-835ECBDEDBFA}"/>
+              </a:ext>
+            </a:extLst>
+          </p:cNvPr>
+          <p:cNvSpPr>
+            <a:spLocks noChangeAspect="1"/>
+          </p:cNvSpPr>
+          <p:nvPr/>
+        </p:nvSpPr>
+        <p:spPr>
+          <a:xfrm>
+            <a:off x="1981201" y="2178446"/>
+            <a:ext cx="1645920" cy="914400"/>
+          </a:xfrm>
+          <a:prstGeom prst="rect">
+            <a:avLst/>
+          </a:prstGeom>
+          <a:solidFill>
+            <a:schemeClr val="tx2"/>
+          </a:solidFill>
+        </p:spPr>
+        <p:style>
+          <a:lnRef idx="2">
+            <a:schemeClr val="accent1">
+              <a:shade val="50000"/>
+            </a:schemeClr>
+          </a:lnRef>
+          <a:fillRef idx="1">
+            <a:schemeClr val="accent1"/>
+          </a:fillRef>
+          <a:effectRef idx="0">
+            <a:schemeClr val="accent1"/>
+          </a:effectRef>
+          <a:fontRef idx="minor">
+            <a:schemeClr val="lt1"/>
+          </a:fontRef>
+        </p:style>
+        <p:txBody>
+          <a:bodyPr rtlCol="0" anchor="ctr"/>
+          <a:lstStyle/>
+          <a:p>
+            <a:pPr algn="ctr"/>
+            <a:r>
+              <a:rPr lang="en-US" sz="1600" dirty="0"/>
+              <a:t>GML</a:t>
+            </a:r>
+          </a:p>
+          <a:p>
+            <a:pPr algn="ctr"/>
+            <a:r>
+              <a:rPr lang="en-US" sz="1600" dirty="0"/>
+              <a:t>Day-ahead Scheduling</a:t>
+            </a:r>
+          </a:p>
+        </p:txBody>
+      </p:sp>
+      <mc:AlternateContent xmlns:mc="http://schemas.openxmlformats.org/markup-compatibility/2006">
+        <mc:Choice xmlns:a14="http://schemas.microsoft.com/office/drawing/2010/main" Requires="a14">
+          <p:sp>
+            <p:nvSpPr>
+              <p:cNvPr id="16" name="TextBox 15">
+                <a:extLst>
+                  <a:ext uri="{FF2B5EF4-FFF2-40B4-BE49-F238E27FC236}">
+                    <a16:creationId xmlns:a16="http://schemas.microsoft.com/office/drawing/2014/main" id="{943E810B-5580-9A4F-B7AF-F7F591246947}"/>
+                  </a:ext>
+                </a:extLst>
+              </p:cNvPr>
+              <p:cNvSpPr txBox="1"/>
+              <p:nvPr/>
+            </p:nvSpPr>
+            <p:spPr>
+              <a:xfrm>
+                <a:off x="3832860" y="2296523"/>
+                <a:ext cx="428066" cy="289695"/>
+              </a:xfrm>
+              <a:prstGeom prst="rect">
+                <a:avLst/>
+              </a:prstGeom>
+              <a:noFill/>
+            </p:spPr>
+            <p:txBody>
+              <a:bodyPr wrap="none" lIns="0" tIns="0" rIns="0" bIns="0" rtlCol="0">
+                <a:spAutoFit/>
+              </a:bodyPr>
+              <a:lstStyle/>
+              <a:p>
+                <a14:m>
+                  <m:oMathPara xmlns:m="http://schemas.openxmlformats.org/officeDocument/2006/math">
+                    <m:oMathParaPr>
+                      <m:jc m:val="centerGroup"/>
+                    </m:oMathParaPr>
+                    <m:oMath xmlns:m="http://schemas.openxmlformats.org/officeDocument/2006/math">
+                      <m:sSubSup>
+                        <m:sSubSupPr>
+                          <m:ctrlPr>
+                            <a:rPr lang="en-US" i="1" smtClean="0">
+                              <a:latin typeface="Cambria Math" panose="02040503050406030204" pitchFamily="18" charset="0"/>
+                            </a:rPr>
+                          </m:ctrlPr>
+                        </m:sSubSupPr>
+                        <m:e>
+                          <m:r>
+                            <a:rPr lang="en-US" b="0" i="1" smtClean="0">
+                              <a:latin typeface="Cambria Math" panose="02040503050406030204" pitchFamily="18" charset="0"/>
+                            </a:rPr>
+                            <m:t>𝑃</m:t>
+                          </m:r>
+                        </m:e>
+                        <m:sub>
+                          <m:r>
+                            <a:rPr lang="en-US" b="0" i="1" smtClean="0">
+                              <a:latin typeface="Cambria Math" panose="02040503050406030204" pitchFamily="18" charset="0"/>
+                            </a:rPr>
+                            <m:t>0</m:t>
+                          </m:r>
+                        </m:sub>
+                        <m:sup>
+                          <m:r>
+                            <a:rPr lang="en-US" b="0" i="1" smtClean="0">
+                              <a:latin typeface="Cambria Math" panose="02040503050406030204" pitchFamily="18" charset="0"/>
+                            </a:rPr>
+                            <m:t>𝑑𝑎</m:t>
+                          </m:r>
+                        </m:sup>
+                      </m:sSubSup>
+                    </m:oMath>
+                  </m:oMathPara>
+                </a14:m>
+                <a:endParaRPr lang="en-US" dirty="0"/>
+              </a:p>
+            </p:txBody>
+          </p:sp>
+        </mc:Choice>
+        <mc:Fallback>
+          <p:sp>
+            <p:nvSpPr>
+              <p:cNvPr id="16" name="TextBox 15">
+                <a:extLst>
+                  <a:ext uri="{FF2B5EF4-FFF2-40B4-BE49-F238E27FC236}">
+                    <a16:creationId xmlns:a16="http://schemas.microsoft.com/office/drawing/2014/main" id="{943E810B-5580-9A4F-B7AF-F7F591246947}"/>
+                  </a:ext>
+                </a:extLst>
+              </p:cNvPr>
+              <p:cNvSpPr txBox="1">
+                <a:spLocks noRot="1" noChangeAspect="1" noMove="1" noResize="1" noEditPoints="1" noAdjustHandles="1" noChangeArrowheads="1" noChangeShapeType="1" noTextEdit="1"/>
+              </p:cNvSpPr>
+              <p:nvPr/>
+            </p:nvSpPr>
+            <p:spPr>
+              <a:xfrm>
+                <a:off x="3832860" y="2296523"/>
+                <a:ext cx="428066" cy="289695"/>
+              </a:xfrm>
+              <a:prstGeom prst="rect">
+                <a:avLst/>
+              </a:prstGeom>
+              <a:blipFill>
+                <a:blip r:embed="rId2"/>
+                <a:stretch>
+                  <a:fillRect l="-11429" r="-2857" b="-16667"/>
+                </a:stretch>
+              </a:blipFill>
+            </p:spPr>
+            <p:txBody>
+              <a:bodyPr/>
+              <a:lstStyle/>
+              <a:p>
+                <a:r>
+                  <a:rPr lang="en-US">
+                    <a:noFill/>
+                  </a:rPr>
+                  <a:t> </a:t>
+                </a:r>
+              </a:p>
+            </p:txBody>
+          </p:sp>
+        </mc:Fallback>
+      </mc:AlternateContent>
+      <p:cxnSp>
+        <p:nvCxnSpPr>
+          <p:cNvPr id="18" name="Straight Arrow Connector 17">
+            <a:extLst>
+              <a:ext uri="{FF2B5EF4-FFF2-40B4-BE49-F238E27FC236}">
+                <a16:creationId xmlns:a16="http://schemas.microsoft.com/office/drawing/2014/main" id="{6FD806B0-5330-5649-A88B-040F634F8C0F}"/>
+              </a:ext>
+            </a:extLst>
+          </p:cNvPr>
+          <p:cNvCxnSpPr>
+            <a:cxnSpLocks/>
+            <a:stCxn id="9" idx="3"/>
+            <a:endCxn id="2" idx="1"/>
+          </p:cNvCxnSpPr>
+          <p:nvPr/>
+        </p:nvCxnSpPr>
+        <p:spPr>
+          <a:xfrm>
+            <a:off x="3627121" y="2635646"/>
+            <a:ext cx="822959" cy="0"/>
+          </a:xfrm>
+          <a:prstGeom prst="straightConnector1">
+            <a:avLst/>
+          </a:prstGeom>
+          <a:ln w="63500">
+            <a:tailEnd type="triangle"/>
+          </a:ln>
+        </p:spPr>
+        <p:style>
+          <a:lnRef idx="1">
+            <a:schemeClr val="accent1"/>
+          </a:lnRef>
+          <a:fillRef idx="0">
+            <a:schemeClr val="accent1"/>
+          </a:fillRef>
+          <a:effectRef idx="0">
+            <a:schemeClr val="accent1"/>
+          </a:effectRef>
+          <a:fontRef idx="minor">
+            <a:schemeClr val="tx1"/>
+          </a:fontRef>
+        </p:style>
+      </p:cxnSp>
+      <p:sp>
+        <p:nvSpPr>
+          <p:cNvPr id="21" name="Rectangle 20">
+            <a:extLst>
+              <a:ext uri="{FF2B5EF4-FFF2-40B4-BE49-F238E27FC236}">
+                <a16:creationId xmlns:a16="http://schemas.microsoft.com/office/drawing/2014/main" id="{9E1FB1A4-AD88-734A-998D-7B08DAE9597C}"/>
+              </a:ext>
+            </a:extLst>
+          </p:cNvPr>
+          <p:cNvSpPr>
+            <a:spLocks noChangeAspect="1"/>
+          </p:cNvSpPr>
+          <p:nvPr/>
+        </p:nvSpPr>
+        <p:spPr>
+          <a:xfrm>
+            <a:off x="1981201" y="578246"/>
+            <a:ext cx="1645920" cy="914400"/>
+          </a:xfrm>
+          <a:prstGeom prst="rect">
+            <a:avLst/>
+          </a:prstGeom>
+          <a:solidFill>
+            <a:schemeClr val="accent5"/>
+          </a:solidFill>
+        </p:spPr>
+        <p:style>
+          <a:lnRef idx="2">
+            <a:schemeClr val="accent1">
+              <a:shade val="50000"/>
+            </a:schemeClr>
+          </a:lnRef>
+          <a:fillRef idx="1">
+            <a:schemeClr val="accent1"/>
+          </a:fillRef>
+          <a:effectRef idx="0">
+            <a:schemeClr val="accent1"/>
+          </a:effectRef>
+          <a:fontRef idx="minor">
+            <a:schemeClr val="lt1"/>
+          </a:fontRef>
+        </p:style>
+        <p:txBody>
+          <a:bodyPr rtlCol="0" anchor="ctr"/>
+          <a:lstStyle/>
+          <a:p>
+            <a:pPr algn="ctr"/>
+            <a:r>
+              <a:rPr lang="en-US" dirty="0"/>
+              <a:t>Day-ahead Markets</a:t>
+            </a:r>
+          </a:p>
+        </p:txBody>
+      </p:sp>
+      <p:sp>
+        <p:nvSpPr>
+          <p:cNvPr id="22" name="Rectangle 21">
+            <a:extLst>
+              <a:ext uri="{FF2B5EF4-FFF2-40B4-BE49-F238E27FC236}">
+                <a16:creationId xmlns:a16="http://schemas.microsoft.com/office/drawing/2014/main" id="{3876022F-5456-CA45-9A90-361245CBB149}"/>
+              </a:ext>
+            </a:extLst>
+          </p:cNvPr>
+          <p:cNvSpPr>
+            <a:spLocks noChangeAspect="1"/>
+          </p:cNvSpPr>
+          <p:nvPr/>
+        </p:nvSpPr>
+        <p:spPr>
+          <a:xfrm>
+            <a:off x="4461613" y="578246"/>
+            <a:ext cx="1645920" cy="914400"/>
+          </a:xfrm>
+          <a:prstGeom prst="rect">
+            <a:avLst/>
+          </a:prstGeom>
+          <a:solidFill>
+            <a:schemeClr val="accent5"/>
+          </a:solidFill>
+        </p:spPr>
+        <p:style>
+          <a:lnRef idx="2">
+            <a:schemeClr val="accent1">
+              <a:shade val="50000"/>
+            </a:schemeClr>
+          </a:lnRef>
+          <a:fillRef idx="1">
+            <a:schemeClr val="accent1"/>
+          </a:fillRef>
+          <a:effectRef idx="0">
+            <a:schemeClr val="accent1"/>
+          </a:effectRef>
+          <a:fontRef idx="minor">
+            <a:schemeClr val="lt1"/>
+          </a:fontRef>
+        </p:style>
+        <p:txBody>
+          <a:bodyPr rtlCol="0" anchor="ctr"/>
+          <a:lstStyle/>
+          <a:p>
+            <a:pPr algn="ctr"/>
+            <a:r>
+              <a:rPr lang="en-US" sz="1600" dirty="0"/>
+              <a:t>Real-time &amp; Ancillary Services</a:t>
+            </a:r>
+          </a:p>
+          <a:p>
+            <a:pPr algn="ctr"/>
+            <a:r>
+              <a:rPr lang="en-US" sz="1600" dirty="0"/>
+              <a:t>Markets</a:t>
+            </a:r>
+          </a:p>
+        </p:txBody>
+      </p:sp>
+      <p:cxnSp>
+        <p:nvCxnSpPr>
+          <p:cNvPr id="24" name="Straight Arrow Connector 23">
+            <a:extLst>
+              <a:ext uri="{FF2B5EF4-FFF2-40B4-BE49-F238E27FC236}">
+                <a16:creationId xmlns:a16="http://schemas.microsoft.com/office/drawing/2014/main" id="{87DBE9E4-EBF4-5F48-9AB5-E05F97E99018}"/>
+              </a:ext>
+            </a:extLst>
+          </p:cNvPr>
+          <p:cNvCxnSpPr>
+            <a:cxnSpLocks/>
+            <a:stCxn id="21" idx="2"/>
+            <a:endCxn id="9" idx="0"/>
+          </p:cNvCxnSpPr>
+          <p:nvPr/>
+        </p:nvCxnSpPr>
+        <p:spPr>
+          <a:xfrm>
+            <a:off x="2804161" y="1492646"/>
+            <a:ext cx="0" cy="685800"/>
+          </a:xfrm>
+          <a:prstGeom prst="straightConnector1">
+            <a:avLst/>
+          </a:prstGeom>
+          <a:ln w="63500">
+            <a:tailEnd type="triangle"/>
+          </a:ln>
+        </p:spPr>
+        <p:style>
+          <a:lnRef idx="1">
+            <a:schemeClr val="accent1"/>
+          </a:lnRef>
+          <a:fillRef idx="0">
+            <a:schemeClr val="accent1"/>
+          </a:fillRef>
+          <a:effectRef idx="0">
+            <a:schemeClr val="accent1"/>
+          </a:effectRef>
+          <a:fontRef idx="minor">
+            <a:schemeClr val="tx1"/>
+          </a:fontRef>
+        </p:style>
+      </p:cxnSp>
+      <p:cxnSp>
+        <p:nvCxnSpPr>
+          <p:cNvPr id="26" name="Straight Arrow Connector 25">
+            <a:extLst>
+              <a:ext uri="{FF2B5EF4-FFF2-40B4-BE49-F238E27FC236}">
+                <a16:creationId xmlns:a16="http://schemas.microsoft.com/office/drawing/2014/main" id="{29ED2077-37BD-614C-812E-F2FBFBA1338C}"/>
+              </a:ext>
+            </a:extLst>
+          </p:cNvPr>
+          <p:cNvCxnSpPr>
+            <a:cxnSpLocks/>
+          </p:cNvCxnSpPr>
+          <p:nvPr/>
+        </p:nvCxnSpPr>
+        <p:spPr>
+          <a:xfrm flipH="1">
+            <a:off x="5705527" y="1492646"/>
+            <a:ext cx="11533" cy="685800"/>
+          </a:xfrm>
+          <a:prstGeom prst="straightConnector1">
+            <a:avLst/>
+          </a:prstGeom>
+          <a:ln w="63500">
+            <a:tailEnd type="triangle"/>
+          </a:ln>
+        </p:spPr>
+        <p:style>
+          <a:lnRef idx="1">
+            <a:schemeClr val="accent1"/>
+          </a:lnRef>
+          <a:fillRef idx="0">
+            <a:schemeClr val="accent1"/>
+          </a:fillRef>
+          <a:effectRef idx="0">
+            <a:schemeClr val="accent1"/>
+          </a:effectRef>
+          <a:fontRef idx="minor">
+            <a:schemeClr val="tx1"/>
+          </a:fontRef>
+        </p:style>
+      </p:cxnSp>
+      <p:cxnSp>
+        <p:nvCxnSpPr>
+          <p:cNvPr id="36" name="Elbow Connector 35">
+            <a:extLst>
+              <a:ext uri="{FF2B5EF4-FFF2-40B4-BE49-F238E27FC236}">
+                <a16:creationId xmlns:a16="http://schemas.microsoft.com/office/drawing/2014/main" id="{B1E19D6B-7A7C-6549-A26F-6B0D383460BC}"/>
+              </a:ext>
+            </a:extLst>
+          </p:cNvPr>
+          <p:cNvCxnSpPr>
+            <a:cxnSpLocks/>
+          </p:cNvCxnSpPr>
+          <p:nvPr/>
+        </p:nvCxnSpPr>
+        <p:spPr>
+          <a:xfrm>
+            <a:off x="2815591" y="1835546"/>
+            <a:ext cx="2066977" cy="342900"/>
+          </a:xfrm>
+          <a:prstGeom prst="bentConnector3">
+            <a:avLst>
+              <a:gd name="adj1" fmla="val 99619"/>
+            </a:avLst>
+          </a:prstGeom>
+          <a:ln w="63500">
+            <a:tailEnd type="triangle"/>
+          </a:ln>
+        </p:spPr>
+        <p:style>
+          <a:lnRef idx="1">
+            <a:schemeClr val="accent1"/>
+          </a:lnRef>
+          <a:fillRef idx="0">
+            <a:schemeClr val="accent1"/>
+          </a:fillRef>
+          <a:effectRef idx="0">
+            <a:schemeClr val="accent1"/>
+          </a:effectRef>
+          <a:fontRef idx="minor">
+            <a:schemeClr val="tx1"/>
+          </a:fontRef>
+        </p:style>
+      </p:cxnSp>
+      <mc:AlternateContent xmlns:mc="http://schemas.openxmlformats.org/markup-compatibility/2006">
+        <mc:Choice xmlns:a14="http://schemas.microsoft.com/office/drawing/2010/main" Requires="a14">
+          <p:sp>
+            <p:nvSpPr>
+              <p:cNvPr id="43" name="TextBox 42">
+                <a:extLst>
+                  <a:ext uri="{FF2B5EF4-FFF2-40B4-BE49-F238E27FC236}">
+                    <a16:creationId xmlns:a16="http://schemas.microsoft.com/office/drawing/2014/main" id="{1F0C3956-0F39-7949-9599-8311E0201CE0}"/>
+                  </a:ext>
+                </a:extLst>
+              </p:cNvPr>
+              <p:cNvSpPr txBox="1"/>
+              <p:nvPr/>
+            </p:nvSpPr>
+            <p:spPr>
+              <a:xfrm>
+                <a:off x="3627121" y="1506518"/>
+                <a:ext cx="581313" cy="374270"/>
+              </a:xfrm>
+              <a:prstGeom prst="rect">
+                <a:avLst/>
+              </a:prstGeom>
+              <a:noFill/>
+            </p:spPr>
+            <p:txBody>
+              <a:bodyPr wrap="none" rtlCol="0">
+                <a:spAutoFit/>
+              </a:bodyPr>
+              <a:lstStyle/>
+              <a:p>
+                <a14:m>
+                  <m:oMathPara xmlns:m="http://schemas.openxmlformats.org/officeDocument/2006/math">
+                    <m:oMathParaPr>
+                      <m:jc m:val="centerGroup"/>
+                    </m:oMathParaPr>
+                    <m:oMath xmlns:m="http://schemas.openxmlformats.org/officeDocument/2006/math">
+                      <m:sSup>
+                        <m:sSupPr>
+                          <m:ctrlPr>
+                            <a:rPr lang="en-US" b="0" i="1" smtClean="0">
+                              <a:latin typeface="Cambria Math" panose="02040503050406030204" pitchFamily="18" charset="0"/>
+                            </a:rPr>
+                          </m:ctrlPr>
+                        </m:sSupPr>
+                        <m:e>
+                          <m:r>
+                            <a:rPr lang="en-US" b="0" i="1" smtClean="0">
+                              <a:latin typeface="Cambria Math" panose="02040503050406030204" pitchFamily="18" charset="0"/>
+                              <a:ea typeface="Cambria Math" panose="02040503050406030204" pitchFamily="18" charset="0"/>
+                            </a:rPr>
+                            <m:t>𝜆</m:t>
+                          </m:r>
+                        </m:e>
+                        <m:sup>
+                          <m:r>
+                            <a:rPr lang="en-US" b="0" i="1" smtClean="0">
+                              <a:latin typeface="Cambria Math" panose="02040503050406030204" pitchFamily="18" charset="0"/>
+                            </a:rPr>
+                            <m:t>𝑑𝑎</m:t>
+                          </m:r>
+                        </m:sup>
+                      </m:sSup>
+                    </m:oMath>
+                  </m:oMathPara>
+                </a14:m>
+                <a:endParaRPr lang="en-US" b="0" dirty="0"/>
+              </a:p>
+            </p:txBody>
+          </p:sp>
+        </mc:Choice>
+        <mc:Fallback>
+          <p:sp>
+            <p:nvSpPr>
+              <p:cNvPr id="43" name="TextBox 42">
+                <a:extLst>
+                  <a:ext uri="{FF2B5EF4-FFF2-40B4-BE49-F238E27FC236}">
+                    <a16:creationId xmlns:a16="http://schemas.microsoft.com/office/drawing/2014/main" id="{1F0C3956-0F39-7949-9599-8311E0201CE0}"/>
+                  </a:ext>
+                </a:extLst>
+              </p:cNvPr>
+              <p:cNvSpPr txBox="1">
+                <a:spLocks noRot="1" noChangeAspect="1" noMove="1" noResize="1" noEditPoints="1" noAdjustHandles="1" noChangeArrowheads="1" noChangeShapeType="1" noTextEdit="1"/>
+              </p:cNvSpPr>
+              <p:nvPr/>
+            </p:nvSpPr>
+            <p:spPr>
+              <a:xfrm>
+                <a:off x="3627121" y="1506518"/>
+                <a:ext cx="581313" cy="374270"/>
+              </a:xfrm>
+              <a:prstGeom prst="rect">
+                <a:avLst/>
+              </a:prstGeom>
+              <a:blipFill>
+                <a:blip r:embed="rId3"/>
+                <a:stretch>
+                  <a:fillRect/>
+                </a:stretch>
+              </a:blipFill>
+            </p:spPr>
+            <p:txBody>
+              <a:bodyPr/>
+              <a:lstStyle/>
+              <a:p>
+                <a:r>
+                  <a:rPr lang="en-US">
+                    <a:noFill/>
+                  </a:rPr>
+                  <a:t> </a:t>
+                </a:r>
+              </a:p>
+            </p:txBody>
+          </p:sp>
+        </mc:Fallback>
+      </mc:AlternateContent>
+      <mc:AlternateContent xmlns:mc="http://schemas.openxmlformats.org/markup-compatibility/2006">
+        <mc:Choice xmlns:a14="http://schemas.microsoft.com/office/drawing/2010/main" Requires="a14">
+          <p:sp>
+            <p:nvSpPr>
+              <p:cNvPr id="45" name="TextBox 44">
+                <a:extLst>
+                  <a:ext uri="{FF2B5EF4-FFF2-40B4-BE49-F238E27FC236}">
+                    <a16:creationId xmlns:a16="http://schemas.microsoft.com/office/drawing/2014/main" id="{26D53485-8A1A-3943-B9A3-5BCBB6516B5D}"/>
+                  </a:ext>
+                </a:extLst>
+              </p:cNvPr>
+              <p:cNvSpPr txBox="1"/>
+              <p:nvPr/>
+            </p:nvSpPr>
+            <p:spPr>
+              <a:xfrm>
+                <a:off x="5717060" y="1616303"/>
+                <a:ext cx="763414" cy="369332"/>
+              </a:xfrm>
+              <a:prstGeom prst="rect">
+                <a:avLst/>
+              </a:prstGeom>
+              <a:noFill/>
+            </p:spPr>
+            <p:txBody>
+              <a:bodyPr wrap="none" rtlCol="0">
+                <a:spAutoFit/>
+              </a:bodyPr>
+              <a:lstStyle/>
+              <a:p>
+                <a14:m>
+                  <m:oMathPara xmlns:m="http://schemas.openxmlformats.org/officeDocument/2006/math">
+                    <m:oMathParaPr>
+                      <m:jc m:val="centerGroup"/>
+                    </m:oMathParaPr>
+                    <m:oMath xmlns:m="http://schemas.openxmlformats.org/officeDocument/2006/math">
+                      <m:sSup>
+                        <m:sSupPr>
+                          <m:ctrlPr>
+                            <a:rPr lang="en-US" b="0" i="1" smtClean="0">
+                              <a:latin typeface="Cambria Math" panose="02040503050406030204" pitchFamily="18" charset="0"/>
+                            </a:rPr>
+                          </m:ctrlPr>
+                        </m:sSupPr>
+                        <m:e>
+                          <m:r>
+                            <a:rPr lang="en-US" b="0" i="1" smtClean="0">
+                              <a:latin typeface="Cambria Math" panose="02040503050406030204" pitchFamily="18" charset="0"/>
+                              <a:ea typeface="Cambria Math" panose="02040503050406030204" pitchFamily="18" charset="0"/>
+                            </a:rPr>
+                            <m:t>𝜆</m:t>
+                          </m:r>
+                        </m:e>
+                        <m:sup>
+                          <m:r>
+                            <a:rPr lang="en-US" b="0" i="1" smtClean="0">
+                              <a:latin typeface="Cambria Math" panose="02040503050406030204" pitchFamily="18" charset="0"/>
+                            </a:rPr>
+                            <m:t>𝑟𝑡</m:t>
+                          </m:r>
+                        </m:sup>
+                      </m:sSup>
+                      <m:r>
+                        <a:rPr lang="en-US" b="0" i="1" smtClean="0">
+                          <a:latin typeface="Cambria Math" panose="02040503050406030204" pitchFamily="18" charset="0"/>
+                        </a:rPr>
+                        <m:t>, </m:t>
+                      </m:r>
+                      <m:r>
+                        <a:rPr lang="en-US" b="0" i="1" smtClean="0">
+                          <a:latin typeface="Cambria Math" panose="02040503050406030204" pitchFamily="18" charset="0"/>
+                          <a:ea typeface="Cambria Math" panose="02040503050406030204" pitchFamily="18" charset="0"/>
+                        </a:rPr>
+                        <m:t>𝛼</m:t>
+                      </m:r>
+                    </m:oMath>
+                  </m:oMathPara>
+                </a14:m>
+                <a:endParaRPr lang="en-US" b="0" dirty="0"/>
+              </a:p>
+            </p:txBody>
+          </p:sp>
+        </mc:Choice>
+        <mc:Fallback>
+          <p:sp>
+            <p:nvSpPr>
+              <p:cNvPr id="45" name="TextBox 44">
+                <a:extLst>
+                  <a:ext uri="{FF2B5EF4-FFF2-40B4-BE49-F238E27FC236}">
+                    <a16:creationId xmlns:a16="http://schemas.microsoft.com/office/drawing/2014/main" id="{26D53485-8A1A-3943-B9A3-5BCBB6516B5D}"/>
+                  </a:ext>
+                </a:extLst>
+              </p:cNvPr>
+              <p:cNvSpPr txBox="1">
+                <a:spLocks noRot="1" noChangeAspect="1" noMove="1" noResize="1" noEditPoints="1" noAdjustHandles="1" noChangeArrowheads="1" noChangeShapeType="1" noTextEdit="1"/>
+              </p:cNvSpPr>
+              <p:nvPr/>
+            </p:nvSpPr>
+            <p:spPr>
+              <a:xfrm>
+                <a:off x="5717060" y="1616303"/>
+                <a:ext cx="763414" cy="369332"/>
+              </a:xfrm>
+              <a:prstGeom prst="rect">
+                <a:avLst/>
+              </a:prstGeom>
+              <a:blipFill>
+                <a:blip r:embed="rId4"/>
+                <a:stretch>
+                  <a:fillRect/>
+                </a:stretch>
+              </a:blipFill>
+            </p:spPr>
+            <p:txBody>
+              <a:bodyPr/>
+              <a:lstStyle/>
+              <a:p>
+                <a:r>
+                  <a:rPr lang="en-US">
+                    <a:noFill/>
+                  </a:rPr>
+                  <a:t> </a:t>
+                </a:r>
+              </a:p>
+            </p:txBody>
+          </p:sp>
+        </mc:Fallback>
+      </mc:AlternateContent>
+    </p:spTree>
+    <p:extLst>
+      <p:ext uri="{BB962C8B-B14F-4D97-AF65-F5344CB8AC3E}">
+        <p14:creationId xmlns:p14="http://schemas.microsoft.com/office/powerpoint/2010/main" val="1405138333"/>
       </p:ext>
     </p:extLst>
   </p:cSld>

</xml_diff>

<commit_message>
add new formualtion with both stochastic and deterministic runs
</commit_message>
<xml_diff>
--- a/3-layer.pptx
+++ b/3-layer.pptx
@@ -261,7 +261,7 @@
           <a:p>
             <a:fld id="{B77773D2-F309-8A41-8C67-2E3A31CF9785}" type="datetimeFigureOut">
               <a:rPr lang="en-US" smtClean="0"/>
-              <a:t>9/29/20</a:t>
+              <a:t>10/15/20</a:t>
             </a:fld>
             <a:endParaRPr lang="en-US"/>
           </a:p>
@@ -459,7 +459,7 @@
           <a:p>
             <a:fld id="{B77773D2-F309-8A41-8C67-2E3A31CF9785}" type="datetimeFigureOut">
               <a:rPr lang="en-US" smtClean="0"/>
-              <a:t>9/29/20</a:t>
+              <a:t>10/15/20</a:t>
             </a:fld>
             <a:endParaRPr lang="en-US"/>
           </a:p>
@@ -667,7 +667,7 @@
           <a:p>
             <a:fld id="{B77773D2-F309-8A41-8C67-2E3A31CF9785}" type="datetimeFigureOut">
               <a:rPr lang="en-US" smtClean="0"/>
-              <a:t>9/29/20</a:t>
+              <a:t>10/15/20</a:t>
             </a:fld>
             <a:endParaRPr lang="en-US"/>
           </a:p>
@@ -865,7 +865,7 @@
           <a:p>
             <a:fld id="{B77773D2-F309-8A41-8C67-2E3A31CF9785}" type="datetimeFigureOut">
               <a:rPr lang="en-US" smtClean="0"/>
-              <a:t>9/29/20</a:t>
+              <a:t>10/15/20</a:t>
             </a:fld>
             <a:endParaRPr lang="en-US"/>
           </a:p>
@@ -1140,7 +1140,7 @@
           <a:p>
             <a:fld id="{B77773D2-F309-8A41-8C67-2E3A31CF9785}" type="datetimeFigureOut">
               <a:rPr lang="en-US" smtClean="0"/>
-              <a:t>9/29/20</a:t>
+              <a:t>10/15/20</a:t>
             </a:fld>
             <a:endParaRPr lang="en-US"/>
           </a:p>
@@ -1405,7 +1405,7 @@
           <a:p>
             <a:fld id="{B77773D2-F309-8A41-8C67-2E3A31CF9785}" type="datetimeFigureOut">
               <a:rPr lang="en-US" smtClean="0"/>
-              <a:t>9/29/20</a:t>
+              <a:t>10/15/20</a:t>
             </a:fld>
             <a:endParaRPr lang="en-US"/>
           </a:p>
@@ -1817,7 +1817,7 @@
           <a:p>
             <a:fld id="{B77773D2-F309-8A41-8C67-2E3A31CF9785}" type="datetimeFigureOut">
               <a:rPr lang="en-US" smtClean="0"/>
-              <a:t>9/29/20</a:t>
+              <a:t>10/15/20</a:t>
             </a:fld>
             <a:endParaRPr lang="en-US"/>
           </a:p>
@@ -1958,7 +1958,7 @@
           <a:p>
             <a:fld id="{B77773D2-F309-8A41-8C67-2E3A31CF9785}" type="datetimeFigureOut">
               <a:rPr lang="en-US" smtClean="0"/>
-              <a:t>9/29/20</a:t>
+              <a:t>10/15/20</a:t>
             </a:fld>
             <a:endParaRPr lang="en-US"/>
           </a:p>
@@ -2071,7 +2071,7 @@
           <a:p>
             <a:fld id="{B77773D2-F309-8A41-8C67-2E3A31CF9785}" type="datetimeFigureOut">
               <a:rPr lang="en-US" smtClean="0"/>
-              <a:t>9/29/20</a:t>
+              <a:t>10/15/20</a:t>
             </a:fld>
             <a:endParaRPr lang="en-US"/>
           </a:p>
@@ -2382,7 +2382,7 @@
           <a:p>
             <a:fld id="{B77773D2-F309-8A41-8C67-2E3A31CF9785}" type="datetimeFigureOut">
               <a:rPr lang="en-US" smtClean="0"/>
-              <a:t>9/29/20</a:t>
+              <a:t>10/15/20</a:t>
             </a:fld>
             <a:endParaRPr lang="en-US"/>
           </a:p>
@@ -2670,7 +2670,7 @@
           <a:p>
             <a:fld id="{B77773D2-F309-8A41-8C67-2E3A31CF9785}" type="datetimeFigureOut">
               <a:rPr lang="en-US" smtClean="0"/>
-              <a:t>9/29/20</a:t>
+              <a:t>10/15/20</a:t>
             </a:fld>
             <a:endParaRPr lang="en-US"/>
           </a:p>
@@ -2911,7 +2911,7 @@
           <a:p>
             <a:fld id="{B77773D2-F309-8A41-8C67-2E3A31CF9785}" type="datetimeFigureOut">
               <a:rPr lang="en-US" smtClean="0"/>
-              <a:t>9/29/20</a:t>
+              <a:t>10/15/20</a:t>
             </a:fld>
             <a:endParaRPr lang="en-US"/>
           </a:p>
@@ -3727,8 +3727,8 @@
             <a:chExt cx="1308500" cy="896562"/>
           </a:xfrm>
         </p:grpSpPr>
-        <mc:AlternateContent xmlns:mc="http://schemas.openxmlformats.org/markup-compatibility/2006">
-          <mc:Choice xmlns:a14="http://schemas.microsoft.com/office/drawing/2010/main" Requires="a14">
+        <mc:AlternateContent xmlns:mc="http://schemas.openxmlformats.org/markup-compatibility/2006" xmlns:a14="http://schemas.microsoft.com/office/drawing/2010/main">
+          <mc:Choice Requires="a14">
             <p:sp>
               <p:nvSpPr>
                 <p:cNvPr id="10" name="TextBox 9">
@@ -3875,7 +3875,7 @@
               </p:txBody>
             </p:sp>
           </mc:Choice>
-          <mc:Fallback>
+          <mc:Fallback xmlns="">
             <p:sp>
               <p:nvSpPr>
                 <p:cNvPr id="10" name="TextBox 9">
@@ -3920,8 +3920,8 @@
             </p:sp>
           </mc:Fallback>
         </mc:AlternateContent>
-        <mc:AlternateContent xmlns:mc="http://schemas.openxmlformats.org/markup-compatibility/2006">
-          <mc:Choice xmlns:a14="http://schemas.microsoft.com/office/drawing/2010/main" Requires="a14">
+        <mc:AlternateContent xmlns:mc="http://schemas.openxmlformats.org/markup-compatibility/2006" xmlns:a14="http://schemas.microsoft.com/office/drawing/2010/main">
+          <mc:Choice Requires="a14">
             <p:sp>
               <p:nvSpPr>
                 <p:cNvPr id="11" name="TextBox 10">
@@ -4010,7 +4010,7 @@
               </p:txBody>
             </p:sp>
           </mc:Choice>
-          <mc:Fallback>
+          <mc:Fallback xmlns="">
             <p:sp>
               <p:nvSpPr>
                 <p:cNvPr id="11" name="TextBox 10">
@@ -4056,8 +4056,8 @@
           </mc:Fallback>
         </mc:AlternateContent>
       </p:grpSp>
-      <mc:AlternateContent xmlns:mc="http://schemas.openxmlformats.org/markup-compatibility/2006">
-        <mc:Choice xmlns:a14="http://schemas.microsoft.com/office/drawing/2010/main" Requires="a14">
+      <mc:AlternateContent xmlns:mc="http://schemas.openxmlformats.org/markup-compatibility/2006" xmlns:a14="http://schemas.microsoft.com/office/drawing/2010/main">
+        <mc:Choice Requires="a14">
           <p:sp>
             <p:nvSpPr>
               <p:cNvPr id="22" name="TextBox 21">
@@ -4256,7 +4256,7 @@
             </p:txBody>
           </p:sp>
         </mc:Choice>
-        <mc:Fallback>
+        <mc:Fallback xmlns="">
           <p:sp>
             <p:nvSpPr>
               <p:cNvPr id="22" name="TextBox 21">
@@ -4318,7 +4318,7 @@
             <p:spPr>
               <a:xfrm>
                 <a:off x="5172538" y="2138057"/>
-                <a:ext cx="1733551" cy="407227"/>
+                <a:ext cx="1471044" cy="369588"/>
               </a:xfrm>
               <a:prstGeom prst="rect">
                 <a:avLst/>
@@ -4361,25 +4361,13 @@
                             </a:rPr>
                             <m:t>𝑖</m:t>
                           </m:r>
-                          <m:r>
-                            <a:rPr lang="en-US" b="0" i="1" smtClean="0">
-                              <a:latin typeface="Cambria Math" panose="02040503050406030204" pitchFamily="18" charset="0"/>
-                            </a:rPr>
-                            <m:t>,</m:t>
-                          </m:r>
-                          <m:r>
-                            <a:rPr lang="en-US" b="0" i="1" smtClean="0">
-                              <a:latin typeface="Cambria Math" panose="02040503050406030204" pitchFamily="18" charset="0"/>
-                            </a:rPr>
-                            <m:t>𝑘</m:t>
-                          </m:r>
                         </m:sub>
                         <m:sup>
                           <m:r>
                             <a:rPr lang="en-US" b="0" i="1" smtClean="0">
                               <a:latin typeface="Cambria Math" panose="02040503050406030204" pitchFamily="18" charset="0"/>
                             </a:rPr>
-                            <m:t>0</m:t>
+                            <m:t>∗</m:t>
                           </m:r>
                         </m:sup>
                       </m:sSubSup>
@@ -4412,25 +4400,13 @@
                             </a:rPr>
                             <m:t>𝑖</m:t>
                           </m:r>
-                          <m:r>
-                            <a:rPr lang="en-US" b="0" i="1" smtClean="0">
-                              <a:latin typeface="Cambria Math" panose="02040503050406030204" pitchFamily="18" charset="0"/>
-                            </a:rPr>
-                            <m:t>,</m:t>
-                          </m:r>
-                          <m:r>
-                            <a:rPr lang="en-US" b="0" i="1" smtClean="0">
-                              <a:latin typeface="Cambria Math" panose="02040503050406030204" pitchFamily="18" charset="0"/>
-                            </a:rPr>
-                            <m:t>𝑘</m:t>
-                          </m:r>
                         </m:sub>
                         <m:sup>
                           <m:r>
                             <a:rPr lang="en-US" b="0" i="1" smtClean="0">
                               <a:latin typeface="Cambria Math" panose="02040503050406030204" pitchFamily="18" charset="0"/>
                             </a:rPr>
-                            <m:t>0</m:t>
+                            <m:t>∗</m:t>
                           </m:r>
                         </m:sup>
                       </m:sSubSup>
@@ -4453,7 +4429,7 @@
                             <a:rPr lang="en-US" b="0" i="1" smtClean="0">
                               <a:latin typeface="Cambria Math" panose="02040503050406030204" pitchFamily="18" charset="0"/>
                             </a:rPr>
-                            <m:t>𝑣</m:t>
+                            <m:t>𝑉</m:t>
                           </m:r>
                         </m:e>
                         <m:sub>
@@ -4469,7 +4445,7 @@
                             <a:rPr lang="en-US" b="0" i="1" smtClean="0">
                               <a:latin typeface="Cambria Math" panose="02040503050406030204" pitchFamily="18" charset="0"/>
                             </a:rPr>
-                            <m:t>0</m:t>
+                            <m:t>∗</m:t>
                           </m:r>
                         </m:sup>
                       </m:sSubSup>
@@ -4482,45 +4458,34 @@
                       <m:sSubSup>
                         <m:sSubSupPr>
                           <m:ctrlPr>
-                            <a:rPr lang="en-US" i="1" smtClean="0">
+                            <a:rPr lang="en-US" altLang="zh-CN" b="0" i="1" smtClean="0">
                               <a:latin typeface="Cambria Math" panose="02040503050406030204" pitchFamily="18" charset="0"/>
                             </a:rPr>
                           </m:ctrlPr>
                         </m:sSubSupPr>
                         <m:e>
                           <m:r>
-                            <a:rPr lang="en-US" b="0" i="1" smtClean="0">
+                            <a:rPr lang="en-US" altLang="zh-CN" b="0" i="1" smtClean="0">
                               <a:latin typeface="Cambria Math" panose="02040503050406030204" pitchFamily="18" charset="0"/>
+                              <a:ea typeface="Cambria Math" panose="02040503050406030204" pitchFamily="18" charset="0"/>
                             </a:rPr>
-                            <m:t>𝑙</m:t>
+                            <m:t>𝜃</m:t>
                           </m:r>
                         </m:e>
                         <m:sub>
                           <m:r>
-                            <a:rPr lang="en-US" b="0" i="1" smtClean="0">
+                            <a:rPr lang="en-US" altLang="zh-CN" b="0" i="1" smtClean="0">
                               <a:latin typeface="Cambria Math" panose="02040503050406030204" pitchFamily="18" charset="0"/>
                             </a:rPr>
                             <m:t>𝑖</m:t>
                           </m:r>
-                          <m:r>
-                            <a:rPr lang="en-US" b="0" i="1" smtClean="0">
-                              <a:latin typeface="Cambria Math" panose="02040503050406030204" pitchFamily="18" charset="0"/>
-                            </a:rPr>
-                            <m:t>,</m:t>
-                          </m:r>
-                          <m:r>
-                            <a:rPr lang="en-US" b="0" i="1" smtClean="0">
-                              <a:latin typeface="Cambria Math" panose="02040503050406030204" pitchFamily="18" charset="0"/>
-                            </a:rPr>
-                            <m:t>𝑘</m:t>
-                          </m:r>
                         </m:sub>
                         <m:sup>
                           <m:r>
-                            <a:rPr lang="en-US" b="0" i="1" smtClean="0">
+                            <a:rPr lang="en-US" altLang="zh-CN" b="0" i="1" smtClean="0">
                               <a:latin typeface="Cambria Math" panose="02040503050406030204" pitchFamily="18" charset="0"/>
                             </a:rPr>
-                            <m:t>0</m:t>
+                            <m:t>∗</m:t>
                           </m:r>
                         </m:sup>
                       </m:sSubSup>
@@ -4550,7 +4515,7 @@
             <p:spPr>
               <a:xfrm>
                 <a:off x="5172538" y="2138057"/>
-                <a:ext cx="1733551" cy="407227"/>
+                <a:ext cx="1471044" cy="369588"/>
               </a:xfrm>
               <a:prstGeom prst="rect">
                 <a:avLst/>
@@ -4558,7 +4523,7 @@
               <a:blipFill>
                 <a:blip r:embed="rId5"/>
                 <a:stretch>
-                  <a:fillRect/>
+                  <a:fillRect b="-6667"/>
                 </a:stretch>
               </a:blipFill>
             </p:spPr>
@@ -4567,7 +4532,7 @@
               <a:lstStyle/>
               <a:p>
                 <a:r>
-                  <a:rPr lang="en-US">
+                  <a:rPr lang="zh-CN" altLang="en-US">
                     <a:noFill/>
                   </a:rPr>
                   <a:t> </a:t>
@@ -4592,13 +4557,13 @@
         <p:grpSpPr>
           <a:xfrm>
             <a:off x="6096000" y="4313505"/>
-            <a:ext cx="1495666" cy="842812"/>
+            <a:ext cx="1054776" cy="842812"/>
             <a:chOff x="2704315" y="4305365"/>
-            <a:chExt cx="1495666" cy="842812"/>
+            <a:chExt cx="1054776" cy="842812"/>
           </a:xfrm>
         </p:grpSpPr>
-        <mc:AlternateContent xmlns:mc="http://schemas.openxmlformats.org/markup-compatibility/2006" xmlns:a14="http://schemas.microsoft.com/office/drawing/2010/main">
-          <mc:Choice Requires="a14">
+        <mc:AlternateContent xmlns:mc="http://schemas.openxmlformats.org/markup-compatibility/2006">
+          <mc:Choice xmlns:a14="http://schemas.microsoft.com/office/drawing/2010/main" Requires="a14">
             <p:sp>
               <p:nvSpPr>
                 <p:cNvPr id="33" name="TextBox 32">
@@ -4614,7 +4579,7 @@
               <p:spPr>
                 <a:xfrm>
                   <a:off x="2704315" y="4305365"/>
-                  <a:ext cx="1495666" cy="289182"/>
+                  <a:ext cx="1054776" cy="276999"/>
                 </a:xfrm>
                 <a:prstGeom prst="rect">
                   <a:avLst/>
@@ -4652,18 +4617,6 @@
                             </a:rPr>
                             <m:t>𝑖</m:t>
                           </m:r>
-                          <m:r>
-                            <a:rPr lang="en-US" b="0" i="1" smtClean="0">
-                              <a:latin typeface="Cambria Math" panose="02040503050406030204" pitchFamily="18" charset="0"/>
-                            </a:rPr>
-                            <m:t>,</m:t>
-                          </m:r>
-                          <m:r>
-                            <a:rPr lang="en-US" b="0" i="1" smtClean="0">
-                              <a:latin typeface="Cambria Math" panose="02040503050406030204" pitchFamily="18" charset="0"/>
-                            </a:rPr>
-                            <m:t>𝑘</m:t>
-                          </m:r>
                         </m:sub>
                       </m:sSub>
                       <m:r>
@@ -4686,51 +4639,6 @@
                               <a:latin typeface="Cambria Math" panose="02040503050406030204" pitchFamily="18" charset="0"/>
                             </a:rPr>
                             <m:t>𝑄</m:t>
-                          </m:r>
-                        </m:e>
-                        <m:sub>
-                          <m:r>
-                            <a:rPr lang="en-US" b="0" i="1" smtClean="0">
-                              <a:latin typeface="Cambria Math" panose="02040503050406030204" pitchFamily="18" charset="0"/>
-                            </a:rPr>
-                            <m:t>𝑖</m:t>
-                          </m:r>
-                          <m:r>
-                            <a:rPr lang="en-US" b="0" i="1" smtClean="0">
-                              <a:latin typeface="Cambria Math" panose="02040503050406030204" pitchFamily="18" charset="0"/>
-                            </a:rPr>
-                            <m:t>,</m:t>
-                          </m:r>
-                          <m:r>
-                            <a:rPr lang="en-US" b="0" i="1" smtClean="0">
-                              <a:latin typeface="Cambria Math" panose="02040503050406030204" pitchFamily="18" charset="0"/>
-                            </a:rPr>
-                            <m:t>𝑘</m:t>
-                          </m:r>
-                        </m:sub>
-                      </m:sSub>
-                    </m:oMath>
-                  </a14:m>
-                  <a:r>
-                    <a:rPr lang="en-US" dirty="0"/>
-                    <a:t>, </a:t>
-                  </a:r>
-                  <a14:m>
-                    <m:oMath xmlns:m="http://schemas.openxmlformats.org/officeDocument/2006/math">
-                      <m:sSub>
-                        <m:sSubPr>
-                          <m:ctrlPr>
-                            <a:rPr lang="en-US" i="1" smtClean="0">
-                              <a:latin typeface="Cambria Math" panose="02040503050406030204" pitchFamily="18" charset="0"/>
-                            </a:rPr>
-                          </m:ctrlPr>
-                        </m:sSubPr>
-                        <m:e>
-                          <m:r>
-                            <a:rPr lang="en-US" b="0" i="1" smtClean="0">
-                              <a:latin typeface="Cambria Math" panose="02040503050406030204" pitchFamily="18" charset="0"/>
-                            </a:rPr>
-                            <m:t>𝑣</m:t>
                           </m:r>
                         </m:e>
                         <m:sub>
@@ -4763,7 +4671,7 @@
                             <a:rPr lang="en-US" b="0" i="1" smtClean="0">
                               <a:latin typeface="Cambria Math" panose="02040503050406030204" pitchFamily="18" charset="0"/>
                             </a:rPr>
-                            <m:t>𝑙</m:t>
+                            <m:t>𝑉</m:t>
                           </m:r>
                         </m:e>
                         <m:sub>
@@ -4773,17 +4681,39 @@
                             </a:rPr>
                             <m:t>𝑖</m:t>
                           </m:r>
-                          <m:r>
-                            <a:rPr lang="en-US" b="0" i="1" smtClean="0">
+                        </m:sub>
+                      </m:sSub>
+                    </m:oMath>
+                  </a14:m>
+                  <a:r>
+                    <a:rPr lang="en-US" dirty="0"/>
+                    <a:t>,</a:t>
+                  </a:r>
+                  <a14:m>
+                    <m:oMath xmlns:m="http://schemas.openxmlformats.org/officeDocument/2006/math">
+                      <m:sSub>
+                        <m:sSubPr>
+                          <m:ctrlPr>
+                            <a:rPr lang="en-US" altLang="zh-CN" i="1" dirty="0" smtClean="0">
                               <a:latin typeface="Cambria Math" panose="02040503050406030204" pitchFamily="18" charset="0"/>
                             </a:rPr>
-                            <m:t>,</m:t>
+                          </m:ctrlPr>
+                        </m:sSubPr>
+                        <m:e>
+                          <m:r>
+                            <a:rPr lang="en-US" altLang="zh-CN" i="1" dirty="0" smtClean="0">
+                              <a:latin typeface="Cambria Math" panose="02040503050406030204" pitchFamily="18" charset="0"/>
+                              <a:ea typeface="Cambria Math" panose="02040503050406030204" pitchFamily="18" charset="0"/>
+                            </a:rPr>
+                            <m:t>𝜃</m:t>
                           </m:r>
+                        </m:e>
+                        <m:sub>
                           <m:r>
-                            <a:rPr lang="en-US" b="0" i="1" smtClean="0">
+                            <a:rPr lang="en-US" altLang="zh-CN" b="0" i="1" dirty="0" smtClean="0">
                               <a:latin typeface="Cambria Math" panose="02040503050406030204" pitchFamily="18" charset="0"/>
                             </a:rPr>
-                            <m:t>𝑘</m:t>
+                            <m:t>𝑖</m:t>
                           </m:r>
                         </m:sub>
                       </m:sSub>
@@ -4794,7 +4724,7 @@
               </p:txBody>
             </p:sp>
           </mc:Choice>
-          <mc:Fallback xmlns="">
+          <mc:Fallback>
             <p:sp>
               <p:nvSpPr>
                 <p:cNvPr id="33" name="TextBox 32">
@@ -4812,7 +4742,7 @@
               <p:spPr>
                 <a:xfrm>
                   <a:off x="2704315" y="4305365"/>
-                  <a:ext cx="1495666" cy="289182"/>
+                  <a:ext cx="1054776" cy="276999"/>
                 </a:xfrm>
                 <a:prstGeom prst="rect">
                   <a:avLst/>
@@ -4820,7 +4750,7 @@
                 <a:blipFill>
                   <a:blip r:embed="rId6"/>
                   <a:stretch>
-                    <a:fillRect l="-5932" t="-20833" r="-1695" b="-45833"/>
+                    <a:fillRect l="-8333" t="-21739" r="-2381" b="-47826"/>
                   </a:stretch>
                 </a:blipFill>
               </p:spPr>
@@ -4829,7 +4759,7 @@
                 <a:lstStyle/>
                 <a:p>
                   <a:r>
-                    <a:rPr lang="en-US">
+                    <a:rPr lang="zh-CN" altLang="en-US">
                       <a:noFill/>
                     </a:rPr>
                     <a:t> </a:t>
@@ -5055,8 +4985,8 @@
           </a:fontRef>
         </p:style>
       </p:cxnSp>
-      <mc:AlternateContent xmlns:mc="http://schemas.openxmlformats.org/markup-compatibility/2006">
-        <mc:Choice xmlns:a14="http://schemas.microsoft.com/office/drawing/2010/main" Requires="a14">
+      <mc:AlternateContent xmlns:mc="http://schemas.openxmlformats.org/markup-compatibility/2006" xmlns:a14="http://schemas.microsoft.com/office/drawing/2010/main">
+        <mc:Choice Requires="a14">
           <p:sp>
             <p:nvSpPr>
               <p:cNvPr id="27" name="TextBox 26">
@@ -5255,7 +5185,7 @@
             </p:txBody>
           </p:sp>
         </mc:Choice>
-        <mc:Fallback>
+        <mc:Fallback xmlns="">
           <p:sp>
             <p:nvSpPr>
               <p:cNvPr id="27" name="TextBox 26">
@@ -5446,8 +5376,8 @@
           </a:fontRef>
         </p:style>
       </p:cxnSp>
-      <mc:AlternateContent xmlns:mc="http://schemas.openxmlformats.org/markup-compatibility/2006">
-        <mc:Choice xmlns:a14="http://schemas.microsoft.com/office/drawing/2010/main" Requires="a14">
+      <mc:AlternateContent xmlns:mc="http://schemas.openxmlformats.org/markup-compatibility/2006" xmlns:a14="http://schemas.microsoft.com/office/drawing/2010/main">
+        <mc:Choice Requires="a14">
           <p:sp>
             <p:nvSpPr>
               <p:cNvPr id="59" name="TextBox 58">
@@ -5614,7 +5544,7 @@
             </p:txBody>
           </p:sp>
         </mc:Choice>
-        <mc:Fallback>
+        <mc:Fallback xmlns="">
           <p:sp>
             <p:nvSpPr>
               <p:cNvPr id="59" name="TextBox 58">
@@ -6000,8 +5930,8 @@
           </a:p>
         </p:txBody>
       </p:sp>
-      <mc:AlternateContent xmlns:mc="http://schemas.openxmlformats.org/markup-compatibility/2006">
-        <mc:Choice xmlns:a14="http://schemas.microsoft.com/office/drawing/2010/main" Requires="a14">
+      <mc:AlternateContent xmlns:mc="http://schemas.openxmlformats.org/markup-compatibility/2006" xmlns:a14="http://schemas.microsoft.com/office/drawing/2010/main">
+        <mc:Choice Requires="a14">
           <p:sp>
             <p:nvSpPr>
               <p:cNvPr id="16" name="TextBox 15">
@@ -6030,6 +5960,7 @@
               </a:bodyPr>
               <a:lstStyle/>
               <a:p>
+                <a:pPr/>
                 <a14:m>
                   <m:oMathPara xmlns:m="http://schemas.openxmlformats.org/officeDocument/2006/math">
                     <m:oMathParaPr>
@@ -6077,7 +6008,7 @@
             </p:txBody>
           </p:sp>
         </mc:Choice>
-        <mc:Fallback>
+        <mc:Fallback xmlns="">
           <p:sp>
             <p:nvSpPr>
               <p:cNvPr id="16" name="TextBox 15">
@@ -6407,8 +6338,8 @@
           </a:fontRef>
         </p:style>
       </p:cxnSp>
-      <mc:AlternateContent xmlns:mc="http://schemas.openxmlformats.org/markup-compatibility/2006">
-        <mc:Choice xmlns:a14="http://schemas.microsoft.com/office/drawing/2010/main" Requires="a14">
+      <mc:AlternateContent xmlns:mc="http://schemas.openxmlformats.org/markup-compatibility/2006" xmlns:a14="http://schemas.microsoft.com/office/drawing/2010/main">
+        <mc:Choice Requires="a14">
           <p:sp>
             <p:nvSpPr>
               <p:cNvPr id="43" name="TextBox 42">
@@ -6437,6 +6368,7 @@
               </a:bodyPr>
               <a:lstStyle/>
               <a:p>
+                <a:pPr/>
                 <a14:m>
                   <m:oMathPara xmlns:m="http://schemas.openxmlformats.org/officeDocument/2006/math">
                     <m:oMathParaPr>
@@ -6477,7 +6409,7 @@
             </p:txBody>
           </p:sp>
         </mc:Choice>
-        <mc:Fallback>
+        <mc:Fallback xmlns="">
           <p:sp>
             <p:nvSpPr>
               <p:cNvPr id="43" name="TextBox 42">
@@ -6522,8 +6454,8 @@
           </p:sp>
         </mc:Fallback>
       </mc:AlternateContent>
-      <mc:AlternateContent xmlns:mc="http://schemas.openxmlformats.org/markup-compatibility/2006">
-        <mc:Choice xmlns:a14="http://schemas.microsoft.com/office/drawing/2010/main" Requires="a14">
+      <mc:AlternateContent xmlns:mc="http://schemas.openxmlformats.org/markup-compatibility/2006" xmlns:a14="http://schemas.microsoft.com/office/drawing/2010/main">
+        <mc:Choice Requires="a14">
           <p:sp>
             <p:nvSpPr>
               <p:cNvPr id="45" name="TextBox 44">
@@ -6552,6 +6484,7 @@
               </a:bodyPr>
               <a:lstStyle/>
               <a:p>
+                <a:pPr/>
                 <a14:m>
                   <m:oMathPara xmlns:m="http://schemas.openxmlformats.org/officeDocument/2006/math">
                     <m:oMathParaPr>
@@ -6605,7 +6538,7 @@
             </p:txBody>
           </p:sp>
         </mc:Choice>
-        <mc:Fallback>
+        <mc:Fallback xmlns="">
           <p:sp>
             <p:nvSpPr>
               <p:cNvPr id="45" name="TextBox 44">

</xml_diff>